<commit_message>
Week 5 and 6 tweaks
</commit_message>
<xml_diff>
--- a/Slides/Geog4300 Fa17 Lecture 5-1 Standard deviation, skew, and variance.pptx
+++ b/Slides/Geog4300 Fa17 Lecture 5-1 Standard deviation, skew, and variance.pptx
@@ -244,6 +244,11 @@
       </a:defRPr>
     </a:lvl9pPr>
   </p:defaultTextStyle>
+  <p:extLst>
+    <p:ext uri="{EFAFB233-063F-42B5-8137-9DF3F51BA10A}">
+      <p15:sldGuideLst xmlns:p15="http://schemas.microsoft.com/office/powerpoint/2012/main"/>
+    </p:ext>
+  </p:extLst>
 </p:presentation>
 </file>
 
@@ -18732,7 +18737,7 @@
               <a:buChar char="•"/>
             </a:pPr>
             <a:r>
-              <a:rPr lang="en-US" sz="2800">
+              <a:rPr lang="en-US" sz="2800" dirty="0">
                 <a:solidFill>
                   <a:srgbClr val="FFFF66"/>
                 </a:solidFill>
@@ -18757,7 +18762,7 @@
               <a:buChar char="•"/>
             </a:pPr>
             <a:r>
-              <a:rPr lang="en-US" sz="2800">
+              <a:rPr lang="en-US" sz="2800" dirty="0">
                 <a:solidFill>
                   <a:srgbClr val="FFFF66"/>
                 </a:solidFill>
@@ -18769,7 +18774,7 @@
               <a:t>Subtract the mean value from each of your cards (find the </a:t>
             </a:r>
             <a:r>
-              <a:rPr lang="en-US" sz="2800" i="1">
+              <a:rPr lang="en-US" sz="2800" i="1" dirty="0">
                 <a:solidFill>
                   <a:srgbClr val="FFFF66"/>
                 </a:solidFill>
@@ -18781,7 +18786,7 @@
               <a:t>deviation</a:t>
             </a:r>
             <a:r>
-              <a:rPr lang="en-US" sz="2800">
+              <a:rPr lang="en-US" sz="2800" dirty="0">
                 <a:solidFill>
                   <a:srgbClr val="FFFF66"/>
                 </a:solidFill>
@@ -18806,7 +18811,7 @@
               <a:buChar char="•"/>
             </a:pPr>
             <a:r>
-              <a:rPr lang="en-US" sz="2800">
+              <a:rPr lang="en-US" sz="2800" dirty="0">
                 <a:solidFill>
                   <a:srgbClr val="FFFF66"/>
                 </a:solidFill>
@@ -19850,7 +19855,7 @@
             <a:r>
               <a:rPr lang="en-US" sz="4000" b="1">
                 <a:solidFill>
-                  <a:srgbClr val="FFFF66"/>
+                  <a:srgbClr val="FFFF00"/>
                 </a:solidFill>
                 <a:latin typeface="Calibri"/>
                 <a:ea typeface="Calibri"/>
@@ -19859,477 +19864,6 @@
               </a:rPr>
               <a:t>The standard deviation</a:t>
             </a:r>
-          </a:p>
-        </p:txBody>
-      </p:sp>
-      <p:sp>
-        <p:nvSpPr>
-          <p:cNvPr id="243" name="Shape 243"/>
-          <p:cNvSpPr txBox="1"/>
-          <p:nvPr/>
-        </p:nvSpPr>
-        <p:spPr>
-          <a:xfrm>
-            <a:off x="175650" y="1920450"/>
-            <a:ext cx="8290800" cy="4191000"/>
-          </a:xfrm>
-          <a:prstGeom prst="rect">
-            <a:avLst/>
-          </a:prstGeom>
-          <a:noFill/>
-          <a:ln>
-            <a:noFill/>
-          </a:ln>
-        </p:spPr>
-        <p:txBody>
-          <a:bodyPr lIns="91425" tIns="45700" rIns="91425" bIns="45700" anchor="t" anchorCtr="0">
-            <a:noAutofit/>
-          </a:bodyPr>
-          <a:lstStyle/>
-          <a:p>
-            <a:pPr marL="342900" marR="0" lvl="0" indent="-342900" algn="l" rtl="0">
-              <a:spcBef>
-                <a:spcPts val="0"/>
-              </a:spcBef>
-              <a:spcAft>
-                <a:spcPts val="0"/>
-              </a:spcAft>
-              <a:buClr>
-                <a:srgbClr val="FFFF66"/>
-              </a:buClr>
-              <a:buSzPct val="25000"/>
-              <a:buFont typeface="Noto Sans Symbols"/>
-              <a:buNone/>
-            </a:pPr>
-            <a:r>
-              <a:rPr lang="en-US" sz="3200" dirty="0">
-                <a:solidFill>
-                  <a:srgbClr val="FFFF66"/>
-                </a:solidFill>
-                <a:latin typeface="Calibri"/>
-                <a:ea typeface="Calibri"/>
-                <a:cs typeface="Calibri"/>
-                <a:sym typeface="Calibri"/>
-              </a:rPr>
-              <a:t>		        </a:t>
-            </a:r>
-            <a:r>
-              <a:rPr lang="en-US" sz="6600" dirty="0">
-                <a:solidFill>
-                  <a:srgbClr val="FFFF66"/>
-                </a:solidFill>
-                <a:latin typeface="Noto Sans Symbols"/>
-                <a:ea typeface="Noto Sans Symbols"/>
-                <a:cs typeface="Noto Sans Symbols"/>
-                <a:sym typeface="Noto Sans Symbols"/>
-              </a:rPr>
-              <a:t>Σ </a:t>
-            </a:r>
-            <a:r>
-              <a:rPr lang="en-US" sz="2800" dirty="0">
-                <a:solidFill>
-                  <a:srgbClr val="FFFF66"/>
-                </a:solidFill>
-                <a:latin typeface="Calibri"/>
-                <a:ea typeface="Calibri"/>
-                <a:cs typeface="Calibri"/>
-                <a:sym typeface="Calibri"/>
-              </a:rPr>
-              <a:t>(</a:t>
-            </a:r>
-            <a:r>
-              <a:rPr lang="en-US" sz="2800" i="1" dirty="0">
-                <a:solidFill>
-                  <a:srgbClr val="FFFF66"/>
-                </a:solidFill>
-                <a:latin typeface="Calibri"/>
-                <a:ea typeface="Calibri"/>
-                <a:cs typeface="Calibri"/>
-                <a:sym typeface="Calibri"/>
-              </a:rPr>
-              <a:t>X</a:t>
-            </a:r>
-            <a:r>
-              <a:rPr lang="en-US" sz="3200" i="1" baseline="-25000" dirty="0">
-                <a:solidFill>
-                  <a:srgbClr val="FFFF66"/>
-                </a:solidFill>
-                <a:latin typeface="Times New Roman"/>
-                <a:ea typeface="Times New Roman"/>
-                <a:cs typeface="Times New Roman"/>
-                <a:sym typeface="Times New Roman"/>
-              </a:rPr>
-              <a:t>i</a:t>
-            </a:r>
-            <a:r>
-              <a:rPr lang="en-US" sz="2800" i="1" dirty="0">
-                <a:solidFill>
-                  <a:srgbClr val="FFFF66"/>
-                </a:solidFill>
-                <a:latin typeface="Calibri"/>
-                <a:ea typeface="Calibri"/>
-                <a:cs typeface="Calibri"/>
-                <a:sym typeface="Calibri"/>
-              </a:rPr>
-              <a:t> – X</a:t>
-            </a:r>
-            <a:r>
-              <a:rPr lang="en-US" sz="2800" dirty="0">
-                <a:solidFill>
-                  <a:srgbClr val="FFFF66"/>
-                </a:solidFill>
-                <a:latin typeface="Calibri"/>
-                <a:ea typeface="Calibri"/>
-                <a:cs typeface="Calibri"/>
-                <a:sym typeface="Calibri"/>
-              </a:rPr>
-              <a:t>)</a:t>
-            </a:r>
-            <a:r>
-              <a:rPr lang="en-US" sz="2800" baseline="30000" dirty="0">
-                <a:solidFill>
-                  <a:srgbClr val="FFFF66"/>
-                </a:solidFill>
-                <a:latin typeface="Calibri"/>
-                <a:ea typeface="Calibri"/>
-                <a:cs typeface="Calibri"/>
-                <a:sym typeface="Calibri"/>
-              </a:rPr>
-              <a:t>2</a:t>
-            </a:r>
-          </a:p>
-          <a:p>
-            <a:pPr marL="342900" marR="0" lvl="0" indent="-342900" algn="l" rtl="0">
-              <a:spcBef>
-                <a:spcPts val="640"/>
-              </a:spcBef>
-              <a:spcAft>
-                <a:spcPts val="0"/>
-              </a:spcAft>
-              <a:buClr>
-                <a:srgbClr val="FFFF66"/>
-              </a:buClr>
-              <a:buSzPct val="25000"/>
-              <a:buFont typeface="Noto Sans Symbols"/>
-              <a:buNone/>
-            </a:pPr>
-            <a:r>
-              <a:rPr lang="en-US" sz="3200" dirty="0">
-                <a:solidFill>
-                  <a:srgbClr val="FFFF66"/>
-                </a:solidFill>
-                <a:latin typeface="Calibri"/>
-                <a:ea typeface="Calibri"/>
-                <a:cs typeface="Calibri"/>
-                <a:sym typeface="Calibri"/>
-              </a:rPr>
-              <a:t>s =     	</a:t>
-            </a:r>
-          </a:p>
-          <a:p>
-            <a:pPr marL="342900" marR="0" lvl="0" indent="-342900" algn="l" rtl="0">
-              <a:spcBef>
-                <a:spcPts val="640"/>
-              </a:spcBef>
-              <a:buClr>
-                <a:srgbClr val="FFFF66"/>
-              </a:buClr>
-              <a:buSzPct val="25000"/>
-              <a:buFont typeface="Noto Sans Symbols"/>
-              <a:buNone/>
-            </a:pPr>
-            <a:r>
-              <a:rPr lang="en-US" sz="3200" dirty="0">
-                <a:solidFill>
-                  <a:srgbClr val="FFFF66"/>
-                </a:solidFill>
-                <a:latin typeface="Calibri"/>
-                <a:ea typeface="Calibri"/>
-                <a:cs typeface="Calibri"/>
-                <a:sym typeface="Calibri"/>
-              </a:rPr>
-              <a:t>			  </a:t>
-            </a:r>
-            <a:r>
-              <a:rPr lang="en-US" sz="3200" dirty="0" smtClean="0">
-                <a:solidFill>
-                  <a:srgbClr val="FFFF66"/>
-                </a:solidFill>
-                <a:latin typeface="Calibri"/>
-                <a:ea typeface="Calibri"/>
-                <a:cs typeface="Calibri"/>
-                <a:sym typeface="Calibri"/>
-              </a:rPr>
-              <a:t>  </a:t>
-            </a:r>
-            <a:r>
-              <a:rPr lang="en-US" sz="3200" i="1" dirty="0" smtClean="0">
-                <a:solidFill>
-                  <a:srgbClr val="FFFF66"/>
-                </a:solidFill>
-                <a:latin typeface="Times New Roman"/>
-                <a:ea typeface="Times New Roman"/>
-                <a:cs typeface="Times New Roman"/>
-                <a:sym typeface="Times New Roman"/>
-              </a:rPr>
-              <a:t>n </a:t>
-            </a:r>
-            <a:r>
-              <a:rPr lang="en-US" sz="3200" dirty="0">
-                <a:solidFill>
-                  <a:srgbClr val="FFFF66"/>
-                </a:solidFill>
-                <a:latin typeface="Calibri"/>
-                <a:ea typeface="Calibri"/>
-                <a:cs typeface="Calibri"/>
-                <a:sym typeface="Calibri"/>
-              </a:rPr>
-              <a:t>-1</a:t>
-            </a:r>
-          </a:p>
-        </p:txBody>
-      </p:sp>
-      <p:cxnSp>
-        <p:nvCxnSpPr>
-          <p:cNvPr id="244" name="Shape 244"/>
-          <p:cNvCxnSpPr/>
-          <p:nvPr/>
-        </p:nvCxnSpPr>
-        <p:spPr>
-          <a:xfrm>
-            <a:off x="2895600" y="2438400"/>
-            <a:ext cx="228600" cy="0"/>
-          </a:xfrm>
-          <a:prstGeom prst="straightConnector1">
-            <a:avLst/>
-          </a:prstGeom>
-          <a:noFill/>
-          <a:ln w="28575" cap="flat" cmpd="sng">
-            <a:solidFill>
-              <a:srgbClr val="FFFF66"/>
-            </a:solidFill>
-            <a:prstDash val="solid"/>
-            <a:miter/>
-            <a:headEnd type="none" w="med" len="med"/>
-            <a:tailEnd type="none" w="med" len="med"/>
-          </a:ln>
-        </p:spPr>
-      </p:cxnSp>
-      <p:cxnSp>
-        <p:nvCxnSpPr>
-          <p:cNvPr id="245" name="Shape 245"/>
-          <p:cNvCxnSpPr/>
-          <p:nvPr/>
-        </p:nvCxnSpPr>
-        <p:spPr>
-          <a:xfrm>
-            <a:off x="1492250" y="3352800"/>
-            <a:ext cx="2286000" cy="0"/>
-          </a:xfrm>
-          <a:prstGeom prst="straightConnector1">
-            <a:avLst/>
-          </a:prstGeom>
-          <a:noFill/>
-          <a:ln w="28575" cap="flat" cmpd="sng">
-            <a:solidFill>
-              <a:srgbClr val="FFFF66"/>
-            </a:solidFill>
-            <a:prstDash val="solid"/>
-            <a:miter/>
-            <a:headEnd type="none" w="med" len="med"/>
-            <a:tailEnd type="none" w="med" len="med"/>
-          </a:ln>
-        </p:spPr>
-      </p:cxnSp>
-      <p:sp>
-        <p:nvSpPr>
-          <p:cNvPr id="246" name="Shape 246"/>
-          <p:cNvSpPr txBox="1"/>
-          <p:nvPr/>
-        </p:nvSpPr>
-        <p:spPr>
-          <a:xfrm>
-            <a:off x="1358900" y="2743200"/>
-            <a:ext cx="639919" cy="369332"/>
-          </a:xfrm>
-          <a:prstGeom prst="rect">
-            <a:avLst/>
-          </a:prstGeom>
-          <a:noFill/>
-          <a:ln w="9525" cap="flat" cmpd="sng">
-            <a:solidFill>
-              <a:srgbClr val="000000"/>
-            </a:solidFill>
-            <a:prstDash val="solid"/>
-            <a:miter/>
-            <a:headEnd type="none" w="med" len="med"/>
-            <a:tailEnd type="none" w="med" len="med"/>
-          </a:ln>
-        </p:spPr>
-        <p:txBody>
-          <a:bodyPr lIns="91425" tIns="45700" rIns="91425" bIns="45700" anchor="t" anchorCtr="0">
-            <a:noAutofit/>
-          </a:bodyPr>
-          <a:lstStyle/>
-          <a:p>
-            <a:pPr marL="0" marR="0" lvl="0" indent="0" algn="l" rtl="0">
-              <a:spcBef>
-                <a:spcPts val="0"/>
-              </a:spcBef>
-              <a:buSzPct val="25000"/>
-              <a:buNone/>
-            </a:pPr>
-            <a:r>
-              <a:rPr lang="en-US" sz="1800" i="1">
-                <a:solidFill>
-                  <a:srgbClr val="FFFF66"/>
-                </a:solidFill>
-                <a:latin typeface="Times New Roman"/>
-                <a:ea typeface="Times New Roman"/>
-                <a:cs typeface="Times New Roman"/>
-                <a:sym typeface="Times New Roman"/>
-              </a:rPr>
-              <a:t>i</a:t>
-            </a:r>
-            <a:r>
-              <a:rPr lang="en-US" sz="1800">
-                <a:solidFill>
-                  <a:srgbClr val="FFFF66"/>
-                </a:solidFill>
-                <a:latin typeface="Arial"/>
-                <a:ea typeface="Arial"/>
-                <a:cs typeface="Arial"/>
-                <a:sym typeface="Arial"/>
-              </a:rPr>
-              <a:t> = 1</a:t>
-            </a:r>
-          </a:p>
-        </p:txBody>
-      </p:sp>
-      <p:sp>
-        <p:nvSpPr>
-          <p:cNvPr id="247" name="Shape 247"/>
-          <p:cNvSpPr txBox="1"/>
-          <p:nvPr/>
-        </p:nvSpPr>
-        <p:spPr>
-          <a:xfrm>
-            <a:off x="1568450" y="1828800"/>
-            <a:ext cx="300081" cy="369332"/>
-          </a:xfrm>
-          <a:prstGeom prst="rect">
-            <a:avLst/>
-          </a:prstGeom>
-          <a:noFill/>
-          <a:ln w="9525" cap="flat" cmpd="sng">
-            <a:solidFill>
-              <a:srgbClr val="000000"/>
-            </a:solidFill>
-            <a:prstDash val="solid"/>
-            <a:miter/>
-            <a:headEnd type="none" w="med" len="med"/>
-            <a:tailEnd type="none" w="med" len="med"/>
-          </a:ln>
-        </p:spPr>
-        <p:txBody>
-          <a:bodyPr lIns="91425" tIns="45700" rIns="91425" bIns="45700" anchor="t" anchorCtr="0">
-            <a:noAutofit/>
-          </a:bodyPr>
-          <a:lstStyle/>
-          <a:p>
-            <a:pPr marL="0" marR="0" lvl="0" indent="0" algn="l" rtl="0">
-              <a:spcBef>
-                <a:spcPts val="0"/>
-              </a:spcBef>
-              <a:buSzPct val="25000"/>
-              <a:buNone/>
-            </a:pPr>
-            <a:r>
-              <a:rPr lang="en-US" sz="1800" i="1">
-                <a:solidFill>
-                  <a:srgbClr val="FFFF66"/>
-                </a:solidFill>
-                <a:latin typeface="Times New Roman"/>
-                <a:ea typeface="Times New Roman"/>
-                <a:cs typeface="Times New Roman"/>
-                <a:sym typeface="Times New Roman"/>
-              </a:rPr>
-              <a:t>n</a:t>
-            </a:r>
-          </a:p>
-        </p:txBody>
-      </p:sp>
-      <p:sp>
-        <p:nvSpPr>
-          <p:cNvPr id="248" name="Shape 248"/>
-          <p:cNvSpPr/>
-          <p:nvPr/>
-        </p:nvSpPr>
-        <p:spPr>
-          <a:xfrm>
-            <a:off x="500450" y="1899162"/>
-            <a:ext cx="2959200" cy="2057400"/>
-          </a:xfrm>
-          <a:custGeom>
-            <a:avLst/>
-            <a:gdLst/>
-            <a:ahLst/>
-            <a:cxnLst/>
-            <a:rect l="0" t="0" r="0" b="0"/>
-            <a:pathLst>
-              <a:path w="120000" h="120000" extrusionOk="0">
-                <a:moveTo>
-                  <a:pt x="0" y="107407"/>
-                </a:moveTo>
-                <a:cubicBezTo>
-                  <a:pt x="3412" y="103240"/>
-                  <a:pt x="5665" y="98518"/>
-                  <a:pt x="10300" y="98518"/>
-                </a:cubicBezTo>
-                <a:lnTo>
-                  <a:pt x="14935" y="120000"/>
-                </a:lnTo>
-                <a:lnTo>
-                  <a:pt x="21115" y="0"/>
-                </a:lnTo>
-                <a:lnTo>
-                  <a:pt x="120000" y="0"/>
-                </a:lnTo>
-              </a:path>
-            </a:pathLst>
-          </a:custGeom>
-          <a:noFill/>
-          <a:ln w="38100" cap="flat" cmpd="sng">
-            <a:solidFill>
-              <a:srgbClr val="FFFF66"/>
-            </a:solidFill>
-            <a:prstDash val="solid"/>
-            <a:miter/>
-            <a:headEnd type="none" w="med" len="med"/>
-            <a:tailEnd type="none" w="med" len="med"/>
-          </a:ln>
-        </p:spPr>
-        <p:txBody>
-          <a:bodyPr lIns="91425" tIns="45700" rIns="91425" bIns="45700" anchor="t" anchorCtr="0">
-            <a:noAutofit/>
-          </a:bodyPr>
-          <a:lstStyle/>
-          <a:p>
-            <a:pPr marL="0" marR="0" lvl="0" indent="0" algn="l" rtl="0">
-              <a:spcBef>
-                <a:spcPts val="0"/>
-              </a:spcBef>
-              <a:buNone/>
-            </a:pPr>
-            <a:endParaRPr sz="1800">
-              <a:solidFill>
-                <a:srgbClr val="FFFF66"/>
-              </a:solidFill>
-              <a:latin typeface="Calibri"/>
-              <a:ea typeface="Calibri"/>
-              <a:cs typeface="Calibri"/>
-              <a:sym typeface="Calibri"/>
-            </a:endParaRPr>
           </a:p>
         </p:txBody>
       </p:sp>
@@ -20368,7 +19902,7 @@
             <a:r>
               <a:rPr lang="en-US" sz="2800">
                 <a:solidFill>
-                  <a:srgbClr val="FFFF66"/>
+                  <a:srgbClr val="FFFF00"/>
                 </a:solidFill>
                 <a:latin typeface="Calibri"/>
                 <a:ea typeface="Calibri"/>
@@ -20389,7 +19923,7 @@
             <a:r>
               <a:rPr lang="en-US" sz="2800">
                 <a:solidFill>
-                  <a:srgbClr val="FFFF66"/>
+                  <a:srgbClr val="FFFF00"/>
                 </a:solidFill>
                 <a:latin typeface="Calibri"/>
                 <a:ea typeface="Calibri"/>
@@ -20436,7 +19970,7 @@
             <a:r>
               <a:rPr lang="en-US" sz="2800">
                 <a:solidFill>
-                  <a:srgbClr val="FFFF66"/>
+                  <a:srgbClr val="FFFF00"/>
                 </a:solidFill>
                 <a:latin typeface="Calibri"/>
                 <a:ea typeface="Calibri"/>
@@ -20457,7 +19991,7 @@
             <a:r>
               <a:rPr lang="en-US" sz="2800">
                 <a:solidFill>
-                  <a:srgbClr val="FFFF66"/>
+                  <a:srgbClr val="FFFF00"/>
                 </a:solidFill>
                 <a:latin typeface="Calibri"/>
                 <a:ea typeface="Calibri"/>
@@ -20504,7 +20038,7 @@
             <a:r>
               <a:rPr lang="en-US" sz="2800">
                 <a:solidFill>
-                  <a:srgbClr val="FFFF66"/>
+                  <a:srgbClr val="FFFF00"/>
                 </a:solidFill>
                 <a:latin typeface="Calibri"/>
                 <a:ea typeface="Calibri"/>
@@ -20525,7 +20059,7 @@
             <a:r>
               <a:rPr lang="en-US" sz="2800">
                 <a:solidFill>
-                  <a:srgbClr val="FFFF66"/>
+                  <a:srgbClr val="FFFF00"/>
                 </a:solidFill>
                 <a:latin typeface="Calibri"/>
                 <a:ea typeface="Calibri"/>
@@ -20572,7 +20106,7 @@
             <a:r>
               <a:rPr lang="en-US" sz="2800">
                 <a:solidFill>
-                  <a:srgbClr val="FFFF66"/>
+                  <a:srgbClr val="FFFF00"/>
                 </a:solidFill>
                 <a:latin typeface="Calibri"/>
                 <a:ea typeface="Calibri"/>
@@ -20593,7 +20127,7 @@
             <a:r>
               <a:rPr lang="en-US" sz="2800">
                 <a:solidFill>
-                  <a:srgbClr val="FFFF66"/>
+                  <a:srgbClr val="FFFF00"/>
                 </a:solidFill>
                 <a:latin typeface="Calibri"/>
                 <a:ea typeface="Calibri"/>
@@ -20640,7 +20174,7 @@
             <a:r>
               <a:rPr lang="en-US" sz="2800">
                 <a:solidFill>
-                  <a:srgbClr val="FFFF66"/>
+                  <a:srgbClr val="FFFF00"/>
                 </a:solidFill>
                 <a:latin typeface="Calibri"/>
                 <a:ea typeface="Calibri"/>
@@ -20652,6 +20186,289 @@
           </a:p>
         </p:txBody>
       </p:sp>
+      <mc:AlternateContent xmlns:mc="http://schemas.openxmlformats.org/markup-compatibility/2006">
+        <mc:Choice xmlns:a14="http://schemas.microsoft.com/office/drawing/2010/main" Requires="a14">
+          <p:sp>
+            <p:nvSpPr>
+              <p:cNvPr id="2" name="TextBox 1"/>
+              <p:cNvSpPr txBox="1"/>
+              <p:nvPr/>
+            </p:nvSpPr>
+            <p:spPr>
+              <a:xfrm>
+                <a:off x="470620" y="2585099"/>
+                <a:ext cx="3921009" cy="1636858"/>
+              </a:xfrm>
+              <a:prstGeom prst="rect">
+                <a:avLst/>
+              </a:prstGeom>
+              <a:noFill/>
+            </p:spPr>
+            <p:txBody>
+              <a:bodyPr wrap="none" lIns="0" tIns="0" rIns="0" bIns="0" rtlCol="0">
+                <a:spAutoFit/>
+              </a:bodyPr>
+              <a:lstStyle/>
+              <a:p>
+                <a14:m>
+                  <m:oMathPara xmlns:m="http://schemas.openxmlformats.org/officeDocument/2006/math">
+                    <m:oMathParaPr>
+                      <m:jc m:val="centerGroup"/>
+                    </m:oMathParaPr>
+                    <m:oMath xmlns:m="http://schemas.openxmlformats.org/officeDocument/2006/math">
+                      <m:r>
+                        <a:rPr lang="en-US" sz="3600" b="0" i="1" smtClean="0">
+                          <a:solidFill>
+                            <a:srgbClr val="FFFF00"/>
+                          </a:solidFill>
+                          <a:latin typeface="Cambria Math" panose="02040503050406030204" pitchFamily="18" charset="0"/>
+                        </a:rPr>
+                        <m:t>𝑠</m:t>
+                      </m:r>
+                      <m:r>
+                        <a:rPr lang="en-US" sz="3600" b="0" i="1" smtClean="0">
+                          <a:solidFill>
+                            <a:srgbClr val="FFFF00"/>
+                          </a:solidFill>
+                          <a:latin typeface="Cambria Math" panose="02040503050406030204" pitchFamily="18" charset="0"/>
+                        </a:rPr>
+                        <m:t>=</m:t>
+                      </m:r>
+                      <m:rad>
+                        <m:radPr>
+                          <m:degHide m:val="on"/>
+                          <m:ctrlPr>
+                            <a:rPr lang="en-US" sz="3600" b="0" i="1" smtClean="0">
+                              <a:solidFill>
+                                <a:srgbClr val="FFFF00"/>
+                              </a:solidFill>
+                              <a:latin typeface="Cambria Math" panose="02040503050406030204" pitchFamily="18" charset="0"/>
+                            </a:rPr>
+                          </m:ctrlPr>
+                        </m:radPr>
+                        <m:deg/>
+                        <m:e>
+                          <m:f>
+                            <m:fPr>
+                              <m:ctrlPr>
+                                <a:rPr lang="en-US" sz="3600" b="0" i="1" smtClean="0">
+                                  <a:solidFill>
+                                    <a:srgbClr val="FFFF00"/>
+                                  </a:solidFill>
+                                  <a:latin typeface="Cambria Math" panose="02040503050406030204" pitchFamily="18" charset="0"/>
+                                </a:rPr>
+                              </m:ctrlPr>
+                            </m:fPr>
+                            <m:num>
+                              <m:nary>
+                                <m:naryPr>
+                                  <m:chr m:val="∑"/>
+                                  <m:ctrlPr>
+                                    <a:rPr lang="en-US" sz="3600" b="0" i="1" smtClean="0">
+                                      <a:solidFill>
+                                        <a:srgbClr val="FFFF00"/>
+                                      </a:solidFill>
+                                      <a:latin typeface="Cambria Math" panose="02040503050406030204" pitchFamily="18" charset="0"/>
+                                    </a:rPr>
+                                  </m:ctrlPr>
+                                </m:naryPr>
+                                <m:sub>
+                                  <m:r>
+                                    <m:rPr>
+                                      <m:brk m:alnAt="23"/>
+                                    </m:rPr>
+                                    <a:rPr lang="en-US" sz="3600" b="0" i="1" smtClean="0">
+                                      <a:solidFill>
+                                        <a:srgbClr val="FFFF00"/>
+                                      </a:solidFill>
+                                      <a:latin typeface="Cambria Math" panose="02040503050406030204" pitchFamily="18" charset="0"/>
+                                    </a:rPr>
+                                    <m:t>𝑖</m:t>
+                                  </m:r>
+                                  <m:r>
+                                    <a:rPr lang="en-US" sz="3600" b="0" i="1" smtClean="0">
+                                      <a:solidFill>
+                                        <a:srgbClr val="FFFF00"/>
+                                      </a:solidFill>
+                                      <a:latin typeface="Cambria Math" panose="02040503050406030204" pitchFamily="18" charset="0"/>
+                                    </a:rPr>
+                                    <m:t>=1</m:t>
+                                  </m:r>
+                                </m:sub>
+                                <m:sup>
+                                  <m:r>
+                                    <a:rPr lang="en-US" sz="3600" b="0" i="1" smtClean="0">
+                                      <a:solidFill>
+                                        <a:srgbClr val="FFFF00"/>
+                                      </a:solidFill>
+                                      <a:latin typeface="Cambria Math" panose="02040503050406030204" pitchFamily="18" charset="0"/>
+                                    </a:rPr>
+                                    <m:t>𝑛</m:t>
+                                  </m:r>
+                                </m:sup>
+                                <m:e>
+                                  <m:sSup>
+                                    <m:sSupPr>
+                                      <m:ctrlPr>
+                                        <a:rPr lang="en-US" sz="3600" b="0" i="1" smtClean="0">
+                                          <a:solidFill>
+                                            <a:srgbClr val="FFFF00"/>
+                                          </a:solidFill>
+                                          <a:latin typeface="Cambria Math" panose="02040503050406030204" pitchFamily="18" charset="0"/>
+                                        </a:rPr>
+                                      </m:ctrlPr>
+                                    </m:sSupPr>
+                                    <m:e>
+                                      <m:r>
+                                        <a:rPr lang="en-US" sz="3600" b="0" i="1" smtClean="0">
+                                          <a:solidFill>
+                                            <a:srgbClr val="FFFF00"/>
+                                          </a:solidFill>
+                                          <a:latin typeface="Cambria Math" panose="02040503050406030204" pitchFamily="18" charset="0"/>
+                                        </a:rPr>
+                                        <m:t>(</m:t>
+                                      </m:r>
+                                      <m:acc>
+                                        <m:accPr>
+                                          <m:chr m:val="̅"/>
+                                          <m:ctrlPr>
+                                            <a:rPr lang="en-US" sz="3600" i="1">
+                                              <a:solidFill>
+                                                <a:srgbClr val="FFFF00"/>
+                                              </a:solidFill>
+                                              <a:latin typeface="Cambria Math" panose="02040503050406030204" pitchFamily="18" charset="0"/>
+                                            </a:rPr>
+                                          </m:ctrlPr>
+                                        </m:accPr>
+                                        <m:e>
+                                          <m:r>
+                                            <a:rPr lang="en-US" sz="3600" i="1">
+                                              <a:solidFill>
+                                                <a:srgbClr val="FFFF00"/>
+                                              </a:solidFill>
+                                              <a:latin typeface="Cambria Math" panose="02040503050406030204" pitchFamily="18" charset="0"/>
+                                            </a:rPr>
+                                            <m:t>𝑋</m:t>
+                                          </m:r>
+                                        </m:e>
+                                      </m:acc>
+                                      <m:r>
+                                        <a:rPr lang="en-US" sz="3600" i="1">
+                                          <a:solidFill>
+                                            <a:srgbClr val="FFFF00"/>
+                                          </a:solidFill>
+                                          <a:latin typeface="Cambria Math" panose="02040503050406030204" pitchFamily="18" charset="0"/>
+                                        </a:rPr>
+                                        <m:t>−</m:t>
+                                      </m:r>
+                                      <m:r>
+                                        <a:rPr lang="en-US" sz="3600" i="1">
+                                          <a:solidFill>
+                                            <a:srgbClr val="FFFF00"/>
+                                          </a:solidFill>
+                                          <a:latin typeface="Cambria Math" panose="02040503050406030204" pitchFamily="18" charset="0"/>
+                                        </a:rPr>
+                                        <m:t>𝑥</m:t>
+                                      </m:r>
+                                      <m:r>
+                                        <a:rPr lang="en-US" sz="3600" i="1">
+                                          <a:solidFill>
+                                            <a:srgbClr val="FFFF00"/>
+                                          </a:solidFill>
+                                          <a:latin typeface="Cambria Math" panose="02040503050406030204" pitchFamily="18" charset="0"/>
+                                        </a:rPr>
+                                        <m:t>)</m:t>
+                                      </m:r>
+                                    </m:e>
+                                    <m:sup>
+                                      <m:r>
+                                        <a:rPr lang="en-US" sz="3600" b="0" i="1" smtClean="0">
+                                          <a:solidFill>
+                                            <a:srgbClr val="FFFF00"/>
+                                          </a:solidFill>
+                                          <a:latin typeface="Cambria Math" panose="02040503050406030204" pitchFamily="18" charset="0"/>
+                                        </a:rPr>
+                                        <m:t>2</m:t>
+                                      </m:r>
+                                    </m:sup>
+                                  </m:sSup>
+                                </m:e>
+                              </m:nary>
+                            </m:num>
+                            <m:den>
+                              <m:r>
+                                <a:rPr lang="en-US" sz="3600" b="0" i="1" smtClean="0">
+                                  <a:solidFill>
+                                    <a:srgbClr val="FFFF00"/>
+                                  </a:solidFill>
+                                  <a:latin typeface="Cambria Math" panose="02040503050406030204" pitchFamily="18" charset="0"/>
+                                </a:rPr>
+                                <m:t>𝑛</m:t>
+                              </m:r>
+                              <m:r>
+                                <a:rPr lang="en-US" sz="3600" b="0" i="1" smtClean="0">
+                                  <a:solidFill>
+                                    <a:srgbClr val="FFFF00"/>
+                                  </a:solidFill>
+                                  <a:latin typeface="Cambria Math" panose="02040503050406030204" pitchFamily="18" charset="0"/>
+                                </a:rPr>
+                                <m:t>−1</m:t>
+                              </m:r>
+                            </m:den>
+                          </m:f>
+                        </m:e>
+                      </m:rad>
+                    </m:oMath>
+                  </m:oMathPara>
+                </a14:m>
+                <a:endParaRPr lang="en-US" sz="1600" dirty="0">
+                  <a:solidFill>
+                    <a:srgbClr val="FFFF00"/>
+                  </a:solidFill>
+                </a:endParaRPr>
+              </a:p>
+            </p:txBody>
+          </p:sp>
+        </mc:Choice>
+        <mc:Fallback>
+          <p:sp>
+            <p:nvSpPr>
+              <p:cNvPr id="2" name="TextBox 1"/>
+              <p:cNvSpPr txBox="1">
+                <a:spLocks noRot="1" noChangeAspect="1" noMove="1" noResize="1" noEditPoints="1" noAdjustHandles="1" noChangeArrowheads="1" noChangeShapeType="1" noTextEdit="1"/>
+              </p:cNvSpPr>
+              <p:nvPr/>
+            </p:nvSpPr>
+            <p:spPr>
+              <a:xfrm>
+                <a:off x="470620" y="2585099"/>
+                <a:ext cx="3921009" cy="1636858"/>
+              </a:xfrm>
+              <a:prstGeom prst="rect">
+                <a:avLst/>
+              </a:prstGeom>
+              <a:blipFill>
+                <a:blip r:embed="rId3"/>
+                <a:stretch>
+                  <a:fillRect/>
+                </a:stretch>
+              </a:blipFill>
+            </p:spPr>
+            <p:txBody>
+              <a:bodyPr/>
+              <a:lstStyle/>
+              <a:p>
+                <a:r>
+                  <a:rPr lang="en-US">
+                    <a:noFill/>
+                  </a:rPr>
+                  <a:t> </a:t>
+                </a:r>
+              </a:p>
+            </p:txBody>
+          </p:sp>
+        </mc:Fallback>
+      </mc:AlternateContent>
     </p:spTree>
   </p:cSld>
   <p:clrMapOvr>
@@ -21108,7 +20925,7 @@
             <a:r>
               <a:rPr lang="en-US" sz="4000" b="1">
                 <a:solidFill>
-                  <a:srgbClr val="FFFF66"/>
+                  <a:srgbClr val="FFFF00"/>
                 </a:solidFill>
                 <a:latin typeface="Calibri"/>
                 <a:ea typeface="Calibri"/>
@@ -21155,7 +20972,7 @@
             <a:r>
               <a:rPr lang="en-US" sz="2800">
                 <a:solidFill>
-                  <a:srgbClr val="FFFF66"/>
+                  <a:srgbClr val="FFFF00"/>
                 </a:solidFill>
                 <a:latin typeface="Calibri"/>
                 <a:ea typeface="Calibri"/>
@@ -21176,7 +20993,7 @@
             <a:r>
               <a:rPr lang="en-US" sz="2800">
                 <a:solidFill>
-                  <a:srgbClr val="FFFF66"/>
+                  <a:srgbClr val="FFFF00"/>
                 </a:solidFill>
                 <a:latin typeface="Calibri"/>
                 <a:ea typeface="Calibri"/>
@@ -21223,7 +21040,7 @@
             <a:r>
               <a:rPr lang="en-US" sz="2800">
                 <a:solidFill>
-                  <a:srgbClr val="FFFF66"/>
+                  <a:srgbClr val="FFFF00"/>
                 </a:solidFill>
                 <a:latin typeface="Calibri"/>
                 <a:ea typeface="Calibri"/>
@@ -21244,7 +21061,7 @@
             <a:r>
               <a:rPr lang="en-US" sz="2800">
                 <a:solidFill>
-                  <a:srgbClr val="FFFF66"/>
+                  <a:srgbClr val="FFFF00"/>
                 </a:solidFill>
                 <a:latin typeface="Calibri"/>
                 <a:ea typeface="Calibri"/>
@@ -21291,7 +21108,7 @@
             <a:r>
               <a:rPr lang="en-US" sz="2800">
                 <a:solidFill>
-                  <a:srgbClr val="FFFF66"/>
+                  <a:srgbClr val="FFFF00"/>
                 </a:solidFill>
                 <a:latin typeface="Calibri"/>
                 <a:ea typeface="Calibri"/>
@@ -21312,7 +21129,7 @@
             <a:r>
               <a:rPr lang="en-US" sz="2800">
                 <a:solidFill>
-                  <a:srgbClr val="FFFF66"/>
+                  <a:srgbClr val="FFFF00"/>
                 </a:solidFill>
                 <a:latin typeface="Calibri"/>
                 <a:ea typeface="Calibri"/>
@@ -21359,7 +21176,7 @@
             <a:r>
               <a:rPr lang="en-US" sz="2800">
                 <a:solidFill>
-                  <a:srgbClr val="FFFF66"/>
+                  <a:srgbClr val="FFFF00"/>
                 </a:solidFill>
                 <a:latin typeface="Calibri"/>
                 <a:ea typeface="Calibri"/>
@@ -21380,7 +21197,7 @@
             <a:r>
               <a:rPr lang="en-US" sz="2800">
                 <a:solidFill>
-                  <a:srgbClr val="FFFF66"/>
+                  <a:srgbClr val="FFFF00"/>
                 </a:solidFill>
                 <a:latin typeface="Calibri"/>
                 <a:ea typeface="Calibri"/>
@@ -21427,7 +21244,7 @@
             <a:r>
               <a:rPr lang="en-US" sz="2800">
                 <a:solidFill>
-                  <a:srgbClr val="FFFF66"/>
+                  <a:srgbClr val="FFFF00"/>
                 </a:solidFill>
                 <a:latin typeface="Calibri"/>
                 <a:ea typeface="Calibri"/>
@@ -21474,7 +21291,7 @@
             <a:r>
               <a:rPr lang="en-US" sz="2800" i="1">
                 <a:solidFill>
-                  <a:srgbClr val="FFFF66"/>
+                  <a:srgbClr val="FFFF00"/>
                 </a:solidFill>
                 <a:latin typeface="Calibri"/>
                 <a:ea typeface="Calibri"/>
@@ -21486,477 +21303,289 @@
           </a:p>
         </p:txBody>
       </p:sp>
-      <p:sp>
-        <p:nvSpPr>
-          <p:cNvPr id="266" name="Shape 266"/>
-          <p:cNvSpPr txBox="1"/>
-          <p:nvPr/>
-        </p:nvSpPr>
-        <p:spPr>
-          <a:xfrm>
-            <a:off x="175650" y="1920450"/>
-            <a:ext cx="8290800" cy="4191000"/>
-          </a:xfrm>
-          <a:prstGeom prst="rect">
-            <a:avLst/>
-          </a:prstGeom>
-          <a:noFill/>
-          <a:ln>
-            <a:noFill/>
-          </a:ln>
-        </p:spPr>
-        <p:txBody>
-          <a:bodyPr lIns="91425" tIns="45700" rIns="91425" bIns="45700" anchor="t" anchorCtr="0">
-            <a:noAutofit/>
-          </a:bodyPr>
-          <a:lstStyle/>
-          <a:p>
-            <a:pPr marL="342900" marR="0" lvl="0" indent="-342900" algn="l" rtl="0">
-              <a:spcBef>
-                <a:spcPts val="0"/>
-              </a:spcBef>
-              <a:spcAft>
-                <a:spcPts val="0"/>
-              </a:spcAft>
-              <a:buClr>
-                <a:srgbClr val="FFFF66"/>
-              </a:buClr>
-              <a:buSzPct val="25000"/>
-              <a:buFont typeface="Noto Sans Symbols"/>
-              <a:buNone/>
-            </a:pPr>
-            <a:r>
-              <a:rPr lang="en-US" sz="3200" dirty="0">
-                <a:solidFill>
-                  <a:srgbClr val="FFFF66"/>
-                </a:solidFill>
-                <a:latin typeface="Calibri"/>
-                <a:ea typeface="Calibri"/>
-                <a:cs typeface="Calibri"/>
-                <a:sym typeface="Calibri"/>
-              </a:rPr>
-              <a:t>		        </a:t>
-            </a:r>
-            <a:r>
-              <a:rPr lang="en-US" sz="6600" dirty="0">
-                <a:solidFill>
-                  <a:srgbClr val="FFFF66"/>
-                </a:solidFill>
-                <a:latin typeface="Noto Sans Symbols"/>
-                <a:ea typeface="Noto Sans Symbols"/>
-                <a:cs typeface="Noto Sans Symbols"/>
-                <a:sym typeface="Noto Sans Symbols"/>
-              </a:rPr>
-              <a:t>Σ </a:t>
-            </a:r>
-            <a:r>
-              <a:rPr lang="en-US" sz="2800" dirty="0">
-                <a:solidFill>
-                  <a:srgbClr val="FFFF66"/>
-                </a:solidFill>
-                <a:latin typeface="Calibri"/>
-                <a:ea typeface="Calibri"/>
-                <a:cs typeface="Calibri"/>
-                <a:sym typeface="Calibri"/>
-              </a:rPr>
-              <a:t>(</a:t>
-            </a:r>
-            <a:r>
-              <a:rPr lang="en-US" sz="2800" i="1" dirty="0">
-                <a:solidFill>
-                  <a:srgbClr val="FFFF66"/>
-                </a:solidFill>
-                <a:latin typeface="Calibri"/>
-                <a:ea typeface="Calibri"/>
-                <a:cs typeface="Calibri"/>
-                <a:sym typeface="Calibri"/>
-              </a:rPr>
-              <a:t>X</a:t>
-            </a:r>
-            <a:r>
-              <a:rPr lang="en-US" sz="3200" i="1" baseline="-25000" dirty="0">
-                <a:solidFill>
-                  <a:srgbClr val="FFFF66"/>
-                </a:solidFill>
-                <a:latin typeface="Times New Roman"/>
-                <a:ea typeface="Times New Roman"/>
-                <a:cs typeface="Times New Roman"/>
-                <a:sym typeface="Times New Roman"/>
-              </a:rPr>
-              <a:t>i</a:t>
-            </a:r>
-            <a:r>
-              <a:rPr lang="en-US" sz="2800" i="1" dirty="0">
-                <a:solidFill>
-                  <a:srgbClr val="FFFF66"/>
-                </a:solidFill>
-                <a:latin typeface="Calibri"/>
-                <a:ea typeface="Calibri"/>
-                <a:cs typeface="Calibri"/>
-                <a:sym typeface="Calibri"/>
-              </a:rPr>
-              <a:t> – X</a:t>
-            </a:r>
-            <a:r>
-              <a:rPr lang="en-US" sz="2800" dirty="0">
-                <a:solidFill>
-                  <a:srgbClr val="FFFF66"/>
-                </a:solidFill>
-                <a:latin typeface="Calibri"/>
-                <a:ea typeface="Calibri"/>
-                <a:cs typeface="Calibri"/>
-                <a:sym typeface="Calibri"/>
-              </a:rPr>
-              <a:t>)</a:t>
-            </a:r>
-            <a:r>
-              <a:rPr lang="en-US" sz="2800" baseline="30000" dirty="0">
-                <a:solidFill>
-                  <a:srgbClr val="FFFF66"/>
-                </a:solidFill>
-                <a:latin typeface="Calibri"/>
-                <a:ea typeface="Calibri"/>
-                <a:cs typeface="Calibri"/>
-                <a:sym typeface="Calibri"/>
-              </a:rPr>
-              <a:t>2</a:t>
-            </a:r>
-          </a:p>
-          <a:p>
-            <a:pPr marL="342900" marR="0" lvl="0" indent="-342900" algn="l" rtl="0">
-              <a:spcBef>
-                <a:spcPts val="640"/>
-              </a:spcBef>
-              <a:spcAft>
-                <a:spcPts val="0"/>
-              </a:spcAft>
-              <a:buClr>
-                <a:srgbClr val="FFFF66"/>
-              </a:buClr>
-              <a:buSzPct val="25000"/>
-              <a:buFont typeface="Noto Sans Symbols"/>
-              <a:buNone/>
-            </a:pPr>
-            <a:r>
-              <a:rPr lang="en-US" sz="3200" dirty="0">
-                <a:solidFill>
-                  <a:srgbClr val="FFFF66"/>
-                </a:solidFill>
-                <a:latin typeface="Calibri"/>
-                <a:ea typeface="Calibri"/>
-                <a:cs typeface="Calibri"/>
-                <a:sym typeface="Calibri"/>
-              </a:rPr>
-              <a:t>s =     	</a:t>
-            </a:r>
-          </a:p>
-          <a:p>
-            <a:pPr marL="342900" marR="0" lvl="0" indent="-342900" algn="l" rtl="0">
-              <a:spcBef>
-                <a:spcPts val="640"/>
-              </a:spcBef>
-              <a:buClr>
-                <a:srgbClr val="FFFF66"/>
-              </a:buClr>
-              <a:buSzPct val="25000"/>
-              <a:buFont typeface="Noto Sans Symbols"/>
-              <a:buNone/>
-            </a:pPr>
-            <a:r>
-              <a:rPr lang="en-US" sz="3200" dirty="0">
-                <a:solidFill>
-                  <a:srgbClr val="FFFF66"/>
-                </a:solidFill>
-                <a:latin typeface="Calibri"/>
-                <a:ea typeface="Calibri"/>
-                <a:cs typeface="Calibri"/>
-                <a:sym typeface="Calibri"/>
-              </a:rPr>
-              <a:t>			   </a:t>
-            </a:r>
-            <a:r>
-              <a:rPr lang="en-US" sz="3200" dirty="0" smtClean="0">
-                <a:solidFill>
-                  <a:srgbClr val="FFFF66"/>
-                </a:solidFill>
-                <a:latin typeface="Calibri"/>
-                <a:ea typeface="Calibri"/>
-                <a:cs typeface="Calibri"/>
-                <a:sym typeface="Calibri"/>
-              </a:rPr>
-              <a:t>  </a:t>
-            </a:r>
-            <a:r>
-              <a:rPr lang="en-US" sz="3200" i="1" dirty="0" smtClean="0">
-                <a:solidFill>
-                  <a:srgbClr val="FFFF66"/>
-                </a:solidFill>
-                <a:latin typeface="Times New Roman"/>
-                <a:ea typeface="Times New Roman"/>
-                <a:cs typeface="Times New Roman"/>
-                <a:sym typeface="Times New Roman"/>
-              </a:rPr>
-              <a:t>n </a:t>
-            </a:r>
-            <a:r>
-              <a:rPr lang="en-US" sz="3200" dirty="0">
-                <a:solidFill>
-                  <a:srgbClr val="FFFF66"/>
-                </a:solidFill>
-                <a:latin typeface="Calibri"/>
-                <a:ea typeface="Calibri"/>
-                <a:cs typeface="Calibri"/>
-                <a:sym typeface="Calibri"/>
-              </a:rPr>
-              <a:t>-1</a:t>
-            </a:r>
-          </a:p>
-        </p:txBody>
-      </p:sp>
-      <p:cxnSp>
-        <p:nvCxnSpPr>
-          <p:cNvPr id="267" name="Shape 267"/>
-          <p:cNvCxnSpPr/>
-          <p:nvPr/>
-        </p:nvCxnSpPr>
-        <p:spPr>
-          <a:xfrm>
-            <a:off x="2895600" y="2438400"/>
-            <a:ext cx="228600" cy="0"/>
-          </a:xfrm>
-          <a:prstGeom prst="straightConnector1">
-            <a:avLst/>
-          </a:prstGeom>
-          <a:noFill/>
-          <a:ln w="28575" cap="flat" cmpd="sng">
-            <a:solidFill>
-              <a:srgbClr val="FFFF66"/>
-            </a:solidFill>
-            <a:prstDash val="solid"/>
-            <a:miter/>
-            <a:headEnd type="none" w="med" len="med"/>
-            <a:tailEnd type="none" w="med" len="med"/>
-          </a:ln>
-        </p:spPr>
-      </p:cxnSp>
-      <p:cxnSp>
-        <p:nvCxnSpPr>
-          <p:cNvPr id="268" name="Shape 268"/>
-          <p:cNvCxnSpPr/>
-          <p:nvPr/>
-        </p:nvCxnSpPr>
-        <p:spPr>
-          <a:xfrm>
-            <a:off x="1492250" y="3352800"/>
-            <a:ext cx="2286000" cy="0"/>
-          </a:xfrm>
-          <a:prstGeom prst="straightConnector1">
-            <a:avLst/>
-          </a:prstGeom>
-          <a:noFill/>
-          <a:ln w="28575" cap="flat" cmpd="sng">
-            <a:solidFill>
-              <a:srgbClr val="FFFF66"/>
-            </a:solidFill>
-            <a:prstDash val="solid"/>
-            <a:miter/>
-            <a:headEnd type="none" w="med" len="med"/>
-            <a:tailEnd type="none" w="med" len="med"/>
-          </a:ln>
-        </p:spPr>
-      </p:cxnSp>
-      <p:sp>
-        <p:nvSpPr>
-          <p:cNvPr id="269" name="Shape 269"/>
-          <p:cNvSpPr txBox="1"/>
-          <p:nvPr/>
-        </p:nvSpPr>
-        <p:spPr>
-          <a:xfrm>
-            <a:off x="1358900" y="2743200"/>
-            <a:ext cx="639900" cy="369300"/>
-          </a:xfrm>
-          <a:prstGeom prst="rect">
-            <a:avLst/>
-          </a:prstGeom>
-          <a:noFill/>
-          <a:ln w="9525" cap="flat" cmpd="sng">
-            <a:solidFill>
-              <a:srgbClr val="000000"/>
-            </a:solidFill>
-            <a:prstDash val="solid"/>
-            <a:miter/>
-            <a:headEnd type="none" w="med" len="med"/>
-            <a:tailEnd type="none" w="med" len="med"/>
-          </a:ln>
-        </p:spPr>
-        <p:txBody>
-          <a:bodyPr lIns="91425" tIns="45700" rIns="91425" bIns="45700" anchor="t" anchorCtr="0">
-            <a:noAutofit/>
-          </a:bodyPr>
-          <a:lstStyle/>
-          <a:p>
-            <a:pPr marL="0" marR="0" lvl="0" indent="0" algn="l" rtl="0">
-              <a:spcBef>
-                <a:spcPts val="0"/>
-              </a:spcBef>
-              <a:buSzPct val="25000"/>
-              <a:buNone/>
-            </a:pPr>
-            <a:r>
-              <a:rPr lang="en-US" sz="1800" i="1">
-                <a:solidFill>
-                  <a:srgbClr val="FFFF66"/>
-                </a:solidFill>
-                <a:latin typeface="Times New Roman"/>
-                <a:ea typeface="Times New Roman"/>
-                <a:cs typeface="Times New Roman"/>
-                <a:sym typeface="Times New Roman"/>
-              </a:rPr>
-              <a:t>i</a:t>
-            </a:r>
-            <a:r>
-              <a:rPr lang="en-US" sz="1800">
-                <a:solidFill>
-                  <a:srgbClr val="FFFF66"/>
-                </a:solidFill>
-                <a:latin typeface="Arial"/>
-                <a:ea typeface="Arial"/>
-                <a:cs typeface="Arial"/>
-                <a:sym typeface="Arial"/>
-              </a:rPr>
-              <a:t> = 1</a:t>
-            </a:r>
-          </a:p>
-        </p:txBody>
-      </p:sp>
-      <p:sp>
-        <p:nvSpPr>
-          <p:cNvPr id="270" name="Shape 270"/>
-          <p:cNvSpPr txBox="1"/>
-          <p:nvPr/>
-        </p:nvSpPr>
-        <p:spPr>
-          <a:xfrm>
-            <a:off x="1568450" y="1828800"/>
-            <a:ext cx="300000" cy="369300"/>
-          </a:xfrm>
-          <a:prstGeom prst="rect">
-            <a:avLst/>
-          </a:prstGeom>
-          <a:noFill/>
-          <a:ln w="9525" cap="flat" cmpd="sng">
-            <a:solidFill>
-              <a:srgbClr val="000000"/>
-            </a:solidFill>
-            <a:prstDash val="solid"/>
-            <a:miter/>
-            <a:headEnd type="none" w="med" len="med"/>
-            <a:tailEnd type="none" w="med" len="med"/>
-          </a:ln>
-        </p:spPr>
-        <p:txBody>
-          <a:bodyPr lIns="91425" tIns="45700" rIns="91425" bIns="45700" anchor="t" anchorCtr="0">
-            <a:noAutofit/>
-          </a:bodyPr>
-          <a:lstStyle/>
-          <a:p>
-            <a:pPr marL="0" marR="0" lvl="0" indent="0" algn="l" rtl="0">
-              <a:spcBef>
-                <a:spcPts val="0"/>
-              </a:spcBef>
-              <a:buSzPct val="25000"/>
-              <a:buNone/>
-            </a:pPr>
-            <a:r>
-              <a:rPr lang="en-US" sz="1800" i="1">
-                <a:solidFill>
-                  <a:srgbClr val="FFFF66"/>
-                </a:solidFill>
-                <a:latin typeface="Times New Roman"/>
-                <a:ea typeface="Times New Roman"/>
-                <a:cs typeface="Times New Roman"/>
-                <a:sym typeface="Times New Roman"/>
-              </a:rPr>
-              <a:t>n</a:t>
-            </a:r>
-          </a:p>
-        </p:txBody>
-      </p:sp>
-      <p:sp>
-        <p:nvSpPr>
-          <p:cNvPr id="271" name="Shape 271"/>
-          <p:cNvSpPr/>
-          <p:nvPr/>
-        </p:nvSpPr>
-        <p:spPr>
-          <a:xfrm>
-            <a:off x="500450" y="1899162"/>
-            <a:ext cx="2959200" cy="2057400"/>
-          </a:xfrm>
-          <a:custGeom>
-            <a:avLst/>
-            <a:gdLst/>
-            <a:ahLst/>
-            <a:cxnLst/>
-            <a:rect l="0" t="0" r="0" b="0"/>
-            <a:pathLst>
-              <a:path w="120000" h="120000" extrusionOk="0">
-                <a:moveTo>
-                  <a:pt x="0" y="107407"/>
-                </a:moveTo>
-                <a:cubicBezTo>
-                  <a:pt x="3412" y="103240"/>
-                  <a:pt x="5665" y="98518"/>
-                  <a:pt x="10300" y="98518"/>
-                </a:cubicBezTo>
-                <a:lnTo>
-                  <a:pt x="14935" y="120000"/>
-                </a:lnTo>
-                <a:lnTo>
-                  <a:pt x="21115" y="0"/>
-                </a:lnTo>
-                <a:lnTo>
-                  <a:pt x="120000" y="0"/>
-                </a:lnTo>
-              </a:path>
-            </a:pathLst>
-          </a:custGeom>
-          <a:noFill/>
-          <a:ln w="38100" cap="flat" cmpd="sng">
-            <a:solidFill>
-              <a:srgbClr val="FFFF66"/>
-            </a:solidFill>
-            <a:prstDash val="solid"/>
-            <a:miter/>
-            <a:headEnd type="none" w="med" len="med"/>
-            <a:tailEnd type="none" w="med" len="med"/>
-          </a:ln>
-        </p:spPr>
-        <p:txBody>
-          <a:bodyPr lIns="91425" tIns="45700" rIns="91425" bIns="45700" anchor="t" anchorCtr="0">
-            <a:noAutofit/>
-          </a:bodyPr>
-          <a:lstStyle/>
-          <a:p>
-            <a:pPr marL="0" marR="0" lvl="0" indent="0" algn="l" rtl="0">
-              <a:spcBef>
-                <a:spcPts val="0"/>
-              </a:spcBef>
-              <a:buNone/>
-            </a:pPr>
-            <a:endParaRPr sz="1800">
-              <a:solidFill>
-                <a:srgbClr val="FFFF66"/>
-              </a:solidFill>
-              <a:latin typeface="Calibri"/>
-              <a:ea typeface="Calibri"/>
-              <a:cs typeface="Calibri"/>
-              <a:sym typeface="Calibri"/>
-            </a:endParaRPr>
-          </a:p>
-        </p:txBody>
-      </p:sp>
+      <mc:AlternateContent xmlns:mc="http://schemas.openxmlformats.org/markup-compatibility/2006">
+        <mc:Choice xmlns:a14="http://schemas.microsoft.com/office/drawing/2010/main" Requires="a14">
+          <p:sp>
+            <p:nvSpPr>
+              <p:cNvPr id="15" name="TextBox 14"/>
+              <p:cNvSpPr txBox="1"/>
+              <p:nvPr/>
+            </p:nvSpPr>
+            <p:spPr>
+              <a:xfrm>
+                <a:off x="415015" y="2300893"/>
+                <a:ext cx="3921009" cy="1636858"/>
+              </a:xfrm>
+              <a:prstGeom prst="rect">
+                <a:avLst/>
+              </a:prstGeom>
+              <a:noFill/>
+            </p:spPr>
+            <p:txBody>
+              <a:bodyPr wrap="none" lIns="0" tIns="0" rIns="0" bIns="0" rtlCol="0">
+                <a:spAutoFit/>
+              </a:bodyPr>
+              <a:lstStyle/>
+              <a:p>
+                <a14:m>
+                  <m:oMathPara xmlns:m="http://schemas.openxmlformats.org/officeDocument/2006/math">
+                    <m:oMathParaPr>
+                      <m:jc m:val="centerGroup"/>
+                    </m:oMathParaPr>
+                    <m:oMath xmlns:m="http://schemas.openxmlformats.org/officeDocument/2006/math">
+                      <m:r>
+                        <a:rPr lang="en-US" sz="3600" b="0" i="1" smtClean="0">
+                          <a:solidFill>
+                            <a:srgbClr val="FFFF00"/>
+                          </a:solidFill>
+                          <a:latin typeface="Cambria Math" panose="02040503050406030204" pitchFamily="18" charset="0"/>
+                        </a:rPr>
+                        <m:t>𝑠</m:t>
+                      </m:r>
+                      <m:r>
+                        <a:rPr lang="en-US" sz="3600" b="0" i="1" smtClean="0">
+                          <a:solidFill>
+                            <a:srgbClr val="FFFF00"/>
+                          </a:solidFill>
+                          <a:latin typeface="Cambria Math" panose="02040503050406030204" pitchFamily="18" charset="0"/>
+                        </a:rPr>
+                        <m:t>=</m:t>
+                      </m:r>
+                      <m:rad>
+                        <m:radPr>
+                          <m:degHide m:val="on"/>
+                          <m:ctrlPr>
+                            <a:rPr lang="en-US" sz="3600" b="0" i="1" smtClean="0">
+                              <a:solidFill>
+                                <a:srgbClr val="FFFF00"/>
+                              </a:solidFill>
+                              <a:latin typeface="Cambria Math" panose="02040503050406030204" pitchFamily="18" charset="0"/>
+                            </a:rPr>
+                          </m:ctrlPr>
+                        </m:radPr>
+                        <m:deg/>
+                        <m:e>
+                          <m:f>
+                            <m:fPr>
+                              <m:ctrlPr>
+                                <a:rPr lang="en-US" sz="3600" b="0" i="1" smtClean="0">
+                                  <a:solidFill>
+                                    <a:srgbClr val="FFFF00"/>
+                                  </a:solidFill>
+                                  <a:latin typeface="Cambria Math" panose="02040503050406030204" pitchFamily="18" charset="0"/>
+                                </a:rPr>
+                              </m:ctrlPr>
+                            </m:fPr>
+                            <m:num>
+                              <m:nary>
+                                <m:naryPr>
+                                  <m:chr m:val="∑"/>
+                                  <m:ctrlPr>
+                                    <a:rPr lang="en-US" sz="3600" b="0" i="1" smtClean="0">
+                                      <a:solidFill>
+                                        <a:srgbClr val="FFFF00"/>
+                                      </a:solidFill>
+                                      <a:latin typeface="Cambria Math" panose="02040503050406030204" pitchFamily="18" charset="0"/>
+                                    </a:rPr>
+                                  </m:ctrlPr>
+                                </m:naryPr>
+                                <m:sub>
+                                  <m:r>
+                                    <m:rPr>
+                                      <m:brk m:alnAt="23"/>
+                                    </m:rPr>
+                                    <a:rPr lang="en-US" sz="3600" b="0" i="1" smtClean="0">
+                                      <a:solidFill>
+                                        <a:srgbClr val="FFFF00"/>
+                                      </a:solidFill>
+                                      <a:latin typeface="Cambria Math" panose="02040503050406030204" pitchFamily="18" charset="0"/>
+                                    </a:rPr>
+                                    <m:t>𝑖</m:t>
+                                  </m:r>
+                                  <m:r>
+                                    <a:rPr lang="en-US" sz="3600" b="0" i="1" smtClean="0">
+                                      <a:solidFill>
+                                        <a:srgbClr val="FFFF00"/>
+                                      </a:solidFill>
+                                      <a:latin typeface="Cambria Math" panose="02040503050406030204" pitchFamily="18" charset="0"/>
+                                    </a:rPr>
+                                    <m:t>=1</m:t>
+                                  </m:r>
+                                </m:sub>
+                                <m:sup>
+                                  <m:r>
+                                    <a:rPr lang="en-US" sz="3600" b="0" i="1" smtClean="0">
+                                      <a:solidFill>
+                                        <a:srgbClr val="FFFF00"/>
+                                      </a:solidFill>
+                                      <a:latin typeface="Cambria Math" panose="02040503050406030204" pitchFamily="18" charset="0"/>
+                                    </a:rPr>
+                                    <m:t>𝑛</m:t>
+                                  </m:r>
+                                </m:sup>
+                                <m:e>
+                                  <m:sSup>
+                                    <m:sSupPr>
+                                      <m:ctrlPr>
+                                        <a:rPr lang="en-US" sz="3600" b="0" i="1" smtClean="0">
+                                          <a:solidFill>
+                                            <a:srgbClr val="FFFF00"/>
+                                          </a:solidFill>
+                                          <a:latin typeface="Cambria Math" panose="02040503050406030204" pitchFamily="18" charset="0"/>
+                                        </a:rPr>
+                                      </m:ctrlPr>
+                                    </m:sSupPr>
+                                    <m:e>
+                                      <m:r>
+                                        <a:rPr lang="en-US" sz="3600" b="0" i="1" smtClean="0">
+                                          <a:solidFill>
+                                            <a:srgbClr val="FFFF00"/>
+                                          </a:solidFill>
+                                          <a:latin typeface="Cambria Math" panose="02040503050406030204" pitchFamily="18" charset="0"/>
+                                        </a:rPr>
+                                        <m:t>(</m:t>
+                                      </m:r>
+                                      <m:acc>
+                                        <m:accPr>
+                                          <m:chr m:val="̅"/>
+                                          <m:ctrlPr>
+                                            <a:rPr lang="en-US" sz="3600" i="1">
+                                              <a:solidFill>
+                                                <a:srgbClr val="FFFF00"/>
+                                              </a:solidFill>
+                                              <a:latin typeface="Cambria Math" panose="02040503050406030204" pitchFamily="18" charset="0"/>
+                                            </a:rPr>
+                                          </m:ctrlPr>
+                                        </m:accPr>
+                                        <m:e>
+                                          <m:r>
+                                            <a:rPr lang="en-US" sz="3600" i="1">
+                                              <a:solidFill>
+                                                <a:srgbClr val="FFFF00"/>
+                                              </a:solidFill>
+                                              <a:latin typeface="Cambria Math" panose="02040503050406030204" pitchFamily="18" charset="0"/>
+                                            </a:rPr>
+                                            <m:t>𝑋</m:t>
+                                          </m:r>
+                                        </m:e>
+                                      </m:acc>
+                                      <m:r>
+                                        <a:rPr lang="en-US" sz="3600" i="1">
+                                          <a:solidFill>
+                                            <a:srgbClr val="FFFF00"/>
+                                          </a:solidFill>
+                                          <a:latin typeface="Cambria Math" panose="02040503050406030204" pitchFamily="18" charset="0"/>
+                                        </a:rPr>
+                                        <m:t>−</m:t>
+                                      </m:r>
+                                      <m:r>
+                                        <a:rPr lang="en-US" sz="3600" i="1">
+                                          <a:solidFill>
+                                            <a:srgbClr val="FFFF00"/>
+                                          </a:solidFill>
+                                          <a:latin typeface="Cambria Math" panose="02040503050406030204" pitchFamily="18" charset="0"/>
+                                        </a:rPr>
+                                        <m:t>𝑥</m:t>
+                                      </m:r>
+                                      <m:r>
+                                        <a:rPr lang="en-US" sz="3600" i="1">
+                                          <a:solidFill>
+                                            <a:srgbClr val="FFFF00"/>
+                                          </a:solidFill>
+                                          <a:latin typeface="Cambria Math" panose="02040503050406030204" pitchFamily="18" charset="0"/>
+                                        </a:rPr>
+                                        <m:t>)</m:t>
+                                      </m:r>
+                                    </m:e>
+                                    <m:sup>
+                                      <m:r>
+                                        <a:rPr lang="en-US" sz="3600" b="0" i="1" smtClean="0">
+                                          <a:solidFill>
+                                            <a:srgbClr val="FFFF00"/>
+                                          </a:solidFill>
+                                          <a:latin typeface="Cambria Math" panose="02040503050406030204" pitchFamily="18" charset="0"/>
+                                        </a:rPr>
+                                        <m:t>2</m:t>
+                                      </m:r>
+                                    </m:sup>
+                                  </m:sSup>
+                                </m:e>
+                              </m:nary>
+                            </m:num>
+                            <m:den>
+                              <m:r>
+                                <a:rPr lang="en-US" sz="3600" b="0" i="1" smtClean="0">
+                                  <a:solidFill>
+                                    <a:srgbClr val="FFFF00"/>
+                                  </a:solidFill>
+                                  <a:latin typeface="Cambria Math" panose="02040503050406030204" pitchFamily="18" charset="0"/>
+                                </a:rPr>
+                                <m:t>𝑛</m:t>
+                              </m:r>
+                              <m:r>
+                                <a:rPr lang="en-US" sz="3600" b="0" i="1" smtClean="0">
+                                  <a:solidFill>
+                                    <a:srgbClr val="FFFF00"/>
+                                  </a:solidFill>
+                                  <a:latin typeface="Cambria Math" panose="02040503050406030204" pitchFamily="18" charset="0"/>
+                                </a:rPr>
+                                <m:t>−1</m:t>
+                              </m:r>
+                            </m:den>
+                          </m:f>
+                        </m:e>
+                      </m:rad>
+                    </m:oMath>
+                  </m:oMathPara>
+                </a14:m>
+                <a:endParaRPr lang="en-US" sz="1600" dirty="0">
+                  <a:solidFill>
+                    <a:srgbClr val="FFFF00"/>
+                  </a:solidFill>
+                </a:endParaRPr>
+              </a:p>
+            </p:txBody>
+          </p:sp>
+        </mc:Choice>
+        <mc:Fallback>
+          <p:sp>
+            <p:nvSpPr>
+              <p:cNvPr id="15" name="TextBox 14"/>
+              <p:cNvSpPr txBox="1">
+                <a:spLocks noRot="1" noChangeAspect="1" noMove="1" noResize="1" noEditPoints="1" noAdjustHandles="1" noChangeArrowheads="1" noChangeShapeType="1" noTextEdit="1"/>
+              </p:cNvSpPr>
+              <p:nvPr/>
+            </p:nvSpPr>
+            <p:spPr>
+              <a:xfrm>
+                <a:off x="415015" y="2300893"/>
+                <a:ext cx="3921009" cy="1636858"/>
+              </a:xfrm>
+              <a:prstGeom prst="rect">
+                <a:avLst/>
+              </a:prstGeom>
+              <a:blipFill>
+                <a:blip r:embed="rId3"/>
+                <a:stretch>
+                  <a:fillRect/>
+                </a:stretch>
+              </a:blipFill>
+            </p:spPr>
+            <p:txBody>
+              <a:bodyPr/>
+              <a:lstStyle/>
+              <a:p>
+                <a:r>
+                  <a:rPr lang="en-US">
+                    <a:noFill/>
+                  </a:rPr>
+                  <a:t> </a:t>
+                </a:r>
+              </a:p>
+            </p:txBody>
+          </p:sp>
+        </mc:Fallback>
+      </mc:AlternateContent>
     </p:spTree>
   </p:cSld>
   <p:clrMapOvr>
@@ -22312,7 +21941,7 @@
             <a:r>
               <a:rPr lang="en-US" sz="4000" b="1">
                 <a:solidFill>
-                  <a:srgbClr val="FFFF66"/>
+                  <a:srgbClr val="FFFF00"/>
                 </a:solidFill>
                 <a:latin typeface="Calibri"/>
                 <a:ea typeface="Calibri"/>
@@ -22359,7 +21988,7 @@
             <a:r>
               <a:rPr lang="en-US" sz="3200">
                 <a:solidFill>
-                  <a:srgbClr val="FFFF66"/>
+                  <a:srgbClr val="FFFF00"/>
                 </a:solidFill>
                 <a:latin typeface="Calibri"/>
                 <a:ea typeface="Calibri"/>
@@ -22380,7 +22009,7 @@
             <a:r>
               <a:rPr lang="en-US" sz="3200">
                 <a:solidFill>
-                  <a:srgbClr val="FFFF66"/>
+                  <a:srgbClr val="FFFF00"/>
                 </a:solidFill>
                 <a:latin typeface="Calibri"/>
                 <a:ea typeface="Calibri"/>
@@ -22427,7 +22056,7 @@
             <a:r>
               <a:rPr lang="en-US" sz="2000">
                 <a:solidFill>
-                  <a:srgbClr val="FFFF66"/>
+                  <a:srgbClr val="FFFF00"/>
                 </a:solidFill>
                 <a:latin typeface="Calibri"/>
                 <a:ea typeface="Calibri"/>
@@ -22439,7 +22068,7 @@
             <a:r>
               <a:rPr lang="en-US" sz="2000" b="1">
                 <a:solidFill>
-                  <a:srgbClr val="FFFF66"/>
+                  <a:srgbClr val="FFFF00"/>
                 </a:solidFill>
                 <a:latin typeface="Calibri"/>
                 <a:ea typeface="Calibri"/>
@@ -22451,7 +22080,7 @@
             <a:r>
               <a:rPr lang="en-US" sz="2000">
                 <a:solidFill>
-                  <a:srgbClr val="FFFF66"/>
+                  <a:srgbClr val="FFFF00"/>
                 </a:solidFill>
                 <a:latin typeface="Calibri"/>
                 <a:ea typeface="Calibri"/>
@@ -22463,465 +22092,289 @@
           </a:p>
         </p:txBody>
       </p:sp>
-      <p:sp>
-        <p:nvSpPr>
-          <p:cNvPr id="280" name="Shape 280"/>
-          <p:cNvSpPr txBox="1"/>
-          <p:nvPr/>
-        </p:nvSpPr>
-        <p:spPr>
-          <a:xfrm>
-            <a:off x="1775850" y="2453850"/>
-            <a:ext cx="8578942" cy="4191000"/>
-          </a:xfrm>
-          <a:prstGeom prst="rect">
-            <a:avLst/>
-          </a:prstGeom>
-          <a:noFill/>
-          <a:ln>
-            <a:noFill/>
-          </a:ln>
-        </p:spPr>
-        <p:txBody>
-          <a:bodyPr lIns="91425" tIns="45700" rIns="91425" bIns="45700" anchor="t" anchorCtr="0">
-            <a:noAutofit/>
-          </a:bodyPr>
-          <a:lstStyle/>
-          <a:p>
-            <a:pPr marL="342900" marR="0" lvl="0" indent="-342900" algn="l" rtl="0">
-              <a:spcBef>
-                <a:spcPts val="0"/>
-              </a:spcBef>
-              <a:spcAft>
-                <a:spcPts val="0"/>
-              </a:spcAft>
-              <a:buClr>
-                <a:srgbClr val="FFFF66"/>
-              </a:buClr>
-              <a:buSzPct val="25000"/>
-              <a:buFont typeface="Noto Sans Symbols"/>
-              <a:buNone/>
-            </a:pPr>
-            <a:r>
-              <a:rPr lang="en-US" sz="3200" dirty="0">
-                <a:solidFill>
-                  <a:srgbClr val="FFFF66"/>
-                </a:solidFill>
-                <a:latin typeface="Calibri"/>
-                <a:ea typeface="Calibri"/>
-                <a:cs typeface="Calibri"/>
-                <a:sym typeface="Calibri"/>
-              </a:rPr>
-              <a:t>		        </a:t>
-            </a:r>
-            <a:r>
-              <a:rPr lang="en-US" sz="6600" dirty="0">
-                <a:solidFill>
-                  <a:srgbClr val="FFFF66"/>
-                </a:solidFill>
-                <a:latin typeface="Noto Sans Symbols"/>
-                <a:ea typeface="Noto Sans Symbols"/>
-                <a:cs typeface="Noto Sans Symbols"/>
-                <a:sym typeface="Noto Sans Symbols"/>
-              </a:rPr>
-              <a:t>Σ </a:t>
-            </a:r>
-            <a:r>
-              <a:rPr lang="en-US" sz="2800" dirty="0">
-                <a:solidFill>
-                  <a:srgbClr val="FFFF66"/>
-                </a:solidFill>
-                <a:latin typeface="Calibri"/>
-                <a:ea typeface="Calibri"/>
-                <a:cs typeface="Calibri"/>
-                <a:sym typeface="Calibri"/>
-              </a:rPr>
-              <a:t>(</a:t>
-            </a:r>
-            <a:r>
-              <a:rPr lang="en-US" sz="2800" i="1" dirty="0">
-                <a:solidFill>
-                  <a:srgbClr val="FFFF66"/>
-                </a:solidFill>
-                <a:latin typeface="Calibri"/>
-                <a:ea typeface="Calibri"/>
-                <a:cs typeface="Calibri"/>
-                <a:sym typeface="Calibri"/>
-              </a:rPr>
-              <a:t>X</a:t>
-            </a:r>
-            <a:r>
-              <a:rPr lang="en-US" sz="3200" i="1" baseline="-25000" dirty="0">
-                <a:solidFill>
-                  <a:srgbClr val="FFFF66"/>
-                </a:solidFill>
-                <a:latin typeface="Times New Roman"/>
-                <a:ea typeface="Times New Roman"/>
-                <a:cs typeface="Times New Roman"/>
-                <a:sym typeface="Times New Roman"/>
-              </a:rPr>
-              <a:t>i</a:t>
-            </a:r>
-            <a:r>
-              <a:rPr lang="en-US" sz="2800" i="1" dirty="0">
-                <a:solidFill>
-                  <a:srgbClr val="FFFF66"/>
-                </a:solidFill>
-                <a:latin typeface="Calibri"/>
-                <a:ea typeface="Calibri"/>
-                <a:cs typeface="Calibri"/>
-                <a:sym typeface="Calibri"/>
-              </a:rPr>
-              <a:t> – X</a:t>
-            </a:r>
-            <a:r>
-              <a:rPr lang="en-US" sz="2800" dirty="0">
-                <a:solidFill>
-                  <a:srgbClr val="FFFF66"/>
-                </a:solidFill>
-                <a:latin typeface="Calibri"/>
-                <a:ea typeface="Calibri"/>
-                <a:cs typeface="Calibri"/>
-                <a:sym typeface="Calibri"/>
-              </a:rPr>
-              <a:t>)</a:t>
-            </a:r>
-            <a:r>
-              <a:rPr lang="en-US" sz="2800" baseline="30000" dirty="0">
-                <a:solidFill>
-                  <a:srgbClr val="FFFF66"/>
-                </a:solidFill>
-                <a:latin typeface="Calibri"/>
-                <a:ea typeface="Calibri"/>
-                <a:cs typeface="Calibri"/>
-                <a:sym typeface="Calibri"/>
-              </a:rPr>
-              <a:t>2</a:t>
-            </a:r>
-          </a:p>
-          <a:p>
-            <a:pPr marL="342900" marR="0" lvl="0" indent="-342900" algn="l" rtl="0">
-              <a:spcBef>
-                <a:spcPts val="640"/>
-              </a:spcBef>
-              <a:spcAft>
-                <a:spcPts val="0"/>
-              </a:spcAft>
-              <a:buClr>
-                <a:srgbClr val="FFFF66"/>
-              </a:buClr>
-              <a:buSzPct val="25000"/>
-              <a:buFont typeface="Noto Sans Symbols"/>
-              <a:buNone/>
-            </a:pPr>
-            <a:r>
-              <a:rPr lang="en-US" sz="3200" dirty="0">
-                <a:solidFill>
-                  <a:srgbClr val="FFFF66"/>
-                </a:solidFill>
-                <a:latin typeface="Calibri"/>
-                <a:ea typeface="Calibri"/>
-                <a:cs typeface="Calibri"/>
-                <a:sym typeface="Calibri"/>
-              </a:rPr>
-              <a:t>s =     	</a:t>
-            </a:r>
-          </a:p>
-          <a:p>
-            <a:pPr marL="342900" marR="0" lvl="0" indent="-342900" algn="l" rtl="0">
-              <a:spcBef>
-                <a:spcPts val="640"/>
-              </a:spcBef>
-              <a:buClr>
-                <a:srgbClr val="FFFF66"/>
-              </a:buClr>
-              <a:buSzPct val="25000"/>
-              <a:buFont typeface="Noto Sans Symbols"/>
-              <a:buNone/>
-            </a:pPr>
-            <a:r>
-              <a:rPr lang="en-US" sz="3200" dirty="0">
-                <a:solidFill>
-                  <a:srgbClr val="FFFF66"/>
-                </a:solidFill>
-                <a:latin typeface="Calibri"/>
-                <a:ea typeface="Calibri"/>
-                <a:cs typeface="Calibri"/>
-                <a:sym typeface="Calibri"/>
-              </a:rPr>
-              <a:t>			    </a:t>
-            </a:r>
-            <a:r>
-              <a:rPr lang="en-US" sz="3200" i="1" dirty="0" smtClean="0">
-                <a:solidFill>
-                  <a:srgbClr val="FFFF66"/>
-                </a:solidFill>
-                <a:latin typeface="Times New Roman"/>
-                <a:ea typeface="Times New Roman"/>
-                <a:cs typeface="Times New Roman"/>
-                <a:sym typeface="Times New Roman"/>
-              </a:rPr>
-              <a:t>n </a:t>
-            </a:r>
-            <a:r>
-              <a:rPr lang="en-US" sz="3200" dirty="0">
-                <a:solidFill>
-                  <a:srgbClr val="FFFF66"/>
-                </a:solidFill>
-                <a:latin typeface="Calibri"/>
-                <a:ea typeface="Calibri"/>
-                <a:cs typeface="Calibri"/>
-                <a:sym typeface="Calibri"/>
-              </a:rPr>
-              <a:t>-1</a:t>
-            </a:r>
-          </a:p>
-        </p:txBody>
-      </p:sp>
-      <p:cxnSp>
-        <p:nvCxnSpPr>
-          <p:cNvPr id="281" name="Shape 281"/>
-          <p:cNvCxnSpPr/>
-          <p:nvPr/>
-        </p:nvCxnSpPr>
-        <p:spPr>
-          <a:xfrm>
-            <a:off x="4495800" y="2971800"/>
-            <a:ext cx="228600" cy="0"/>
-          </a:xfrm>
-          <a:prstGeom prst="straightConnector1">
-            <a:avLst/>
-          </a:prstGeom>
-          <a:noFill/>
-          <a:ln w="28575" cap="flat" cmpd="sng">
-            <a:solidFill>
-              <a:srgbClr val="FFFF66"/>
-            </a:solidFill>
-            <a:prstDash val="solid"/>
-            <a:miter/>
-            <a:headEnd type="none" w="med" len="med"/>
-            <a:tailEnd type="none" w="med" len="med"/>
-          </a:ln>
-        </p:spPr>
-      </p:cxnSp>
-      <p:cxnSp>
-        <p:nvCxnSpPr>
-          <p:cNvPr id="282" name="Shape 282"/>
-          <p:cNvCxnSpPr/>
-          <p:nvPr/>
-        </p:nvCxnSpPr>
-        <p:spPr>
-          <a:xfrm>
-            <a:off x="3092450" y="3886200"/>
-            <a:ext cx="2286000" cy="0"/>
-          </a:xfrm>
-          <a:prstGeom prst="straightConnector1">
-            <a:avLst/>
-          </a:prstGeom>
-          <a:noFill/>
-          <a:ln w="28575" cap="flat" cmpd="sng">
-            <a:solidFill>
-              <a:srgbClr val="FFFF66"/>
-            </a:solidFill>
-            <a:prstDash val="solid"/>
-            <a:miter/>
-            <a:headEnd type="none" w="med" len="med"/>
-            <a:tailEnd type="none" w="med" len="med"/>
-          </a:ln>
-        </p:spPr>
-      </p:cxnSp>
-      <p:sp>
-        <p:nvSpPr>
-          <p:cNvPr id="283" name="Shape 283"/>
-          <p:cNvSpPr txBox="1"/>
-          <p:nvPr/>
-        </p:nvSpPr>
-        <p:spPr>
-          <a:xfrm>
-            <a:off x="2959100" y="3276600"/>
-            <a:ext cx="639900" cy="369300"/>
-          </a:xfrm>
-          <a:prstGeom prst="rect">
-            <a:avLst/>
-          </a:prstGeom>
-          <a:noFill/>
-          <a:ln w="9525" cap="flat" cmpd="sng">
-            <a:solidFill>
-              <a:srgbClr val="000000"/>
-            </a:solidFill>
-            <a:prstDash val="solid"/>
-            <a:miter/>
-            <a:headEnd type="none" w="med" len="med"/>
-            <a:tailEnd type="none" w="med" len="med"/>
-          </a:ln>
-        </p:spPr>
-        <p:txBody>
-          <a:bodyPr lIns="91425" tIns="45700" rIns="91425" bIns="45700" anchor="t" anchorCtr="0">
-            <a:noAutofit/>
-          </a:bodyPr>
-          <a:lstStyle/>
-          <a:p>
-            <a:pPr marL="0" marR="0" lvl="0" indent="0" algn="l" rtl="0">
-              <a:spcBef>
-                <a:spcPts val="0"/>
-              </a:spcBef>
-              <a:buSzPct val="25000"/>
-              <a:buNone/>
-            </a:pPr>
-            <a:r>
-              <a:rPr lang="en-US" sz="1800" i="1">
-                <a:solidFill>
-                  <a:srgbClr val="FFFF66"/>
-                </a:solidFill>
-                <a:latin typeface="Times New Roman"/>
-                <a:ea typeface="Times New Roman"/>
-                <a:cs typeface="Times New Roman"/>
-                <a:sym typeface="Times New Roman"/>
-              </a:rPr>
-              <a:t>i</a:t>
-            </a:r>
-            <a:r>
-              <a:rPr lang="en-US" sz="1800">
-                <a:solidFill>
-                  <a:srgbClr val="FFFF66"/>
-                </a:solidFill>
-                <a:latin typeface="Arial"/>
-                <a:ea typeface="Arial"/>
-                <a:cs typeface="Arial"/>
-                <a:sym typeface="Arial"/>
-              </a:rPr>
-              <a:t> = 1</a:t>
-            </a:r>
-          </a:p>
-        </p:txBody>
-      </p:sp>
-      <p:sp>
-        <p:nvSpPr>
-          <p:cNvPr id="284" name="Shape 284"/>
-          <p:cNvSpPr txBox="1"/>
-          <p:nvPr/>
-        </p:nvSpPr>
-        <p:spPr>
-          <a:xfrm>
-            <a:off x="3168650" y="2362200"/>
-            <a:ext cx="300000" cy="369300"/>
-          </a:xfrm>
-          <a:prstGeom prst="rect">
-            <a:avLst/>
-          </a:prstGeom>
-          <a:noFill/>
-          <a:ln w="9525" cap="flat" cmpd="sng">
-            <a:solidFill>
-              <a:srgbClr val="000000"/>
-            </a:solidFill>
-            <a:prstDash val="solid"/>
-            <a:miter/>
-            <a:headEnd type="none" w="med" len="med"/>
-            <a:tailEnd type="none" w="med" len="med"/>
-          </a:ln>
-        </p:spPr>
-        <p:txBody>
-          <a:bodyPr lIns="91425" tIns="45700" rIns="91425" bIns="45700" anchor="t" anchorCtr="0">
-            <a:noAutofit/>
-          </a:bodyPr>
-          <a:lstStyle/>
-          <a:p>
-            <a:pPr marL="0" marR="0" lvl="0" indent="0" algn="l" rtl="0">
-              <a:spcBef>
-                <a:spcPts val="0"/>
-              </a:spcBef>
-              <a:buSzPct val="25000"/>
-              <a:buNone/>
-            </a:pPr>
-            <a:r>
-              <a:rPr lang="en-US" sz="1800" i="1">
-                <a:solidFill>
-                  <a:srgbClr val="FFFF66"/>
-                </a:solidFill>
-                <a:latin typeface="Times New Roman"/>
-                <a:ea typeface="Times New Roman"/>
-                <a:cs typeface="Times New Roman"/>
-                <a:sym typeface="Times New Roman"/>
-              </a:rPr>
-              <a:t>n</a:t>
-            </a:r>
-          </a:p>
-        </p:txBody>
-      </p:sp>
-      <p:sp>
-        <p:nvSpPr>
-          <p:cNvPr id="285" name="Shape 285"/>
-          <p:cNvSpPr/>
-          <p:nvPr/>
-        </p:nvSpPr>
-        <p:spPr>
-          <a:xfrm>
-            <a:off x="2100650" y="2432562"/>
-            <a:ext cx="3757816" cy="2057400"/>
-          </a:xfrm>
-          <a:custGeom>
-            <a:avLst/>
-            <a:gdLst/>
-            <a:ahLst/>
-            <a:cxnLst/>
-            <a:rect l="0" t="0" r="0" b="0"/>
-            <a:pathLst>
-              <a:path w="120000" h="120000" extrusionOk="0">
-                <a:moveTo>
-                  <a:pt x="0" y="107407"/>
-                </a:moveTo>
-                <a:cubicBezTo>
-                  <a:pt x="3412" y="103240"/>
-                  <a:pt x="5665" y="98518"/>
-                  <a:pt x="10300" y="98518"/>
-                </a:cubicBezTo>
-                <a:lnTo>
-                  <a:pt x="14935" y="120000"/>
-                </a:lnTo>
-                <a:lnTo>
-                  <a:pt x="21115" y="0"/>
-                </a:lnTo>
-                <a:lnTo>
-                  <a:pt x="120000" y="0"/>
-                </a:lnTo>
-              </a:path>
-            </a:pathLst>
-          </a:custGeom>
-          <a:noFill/>
-          <a:ln w="38100" cap="flat" cmpd="sng">
-            <a:solidFill>
-              <a:srgbClr val="FFFF66"/>
-            </a:solidFill>
-            <a:prstDash val="solid"/>
-            <a:miter/>
-            <a:headEnd type="none" w="med" len="med"/>
-            <a:tailEnd type="none" w="med" len="med"/>
-          </a:ln>
-        </p:spPr>
-        <p:txBody>
-          <a:bodyPr lIns="91425" tIns="45700" rIns="91425" bIns="45700" anchor="t" anchorCtr="0">
-            <a:noAutofit/>
-          </a:bodyPr>
-          <a:lstStyle/>
-          <a:p>
-            <a:pPr marL="0" marR="0" lvl="0" indent="0" algn="l" rtl="0">
-              <a:spcBef>
-                <a:spcPts val="0"/>
-              </a:spcBef>
-              <a:buNone/>
-            </a:pPr>
-            <a:endParaRPr sz="1800">
-              <a:solidFill>
-                <a:srgbClr val="FFFF66"/>
-              </a:solidFill>
-              <a:latin typeface="Calibri"/>
-              <a:ea typeface="Calibri"/>
-              <a:cs typeface="Calibri"/>
-              <a:sym typeface="Calibri"/>
-            </a:endParaRPr>
-          </a:p>
-        </p:txBody>
-      </p:sp>
+      <mc:AlternateContent xmlns:mc="http://schemas.openxmlformats.org/markup-compatibility/2006">
+        <mc:Choice xmlns:a14="http://schemas.microsoft.com/office/drawing/2010/main" Requires="a14">
+          <p:sp>
+            <p:nvSpPr>
+              <p:cNvPr id="11" name="TextBox 10"/>
+              <p:cNvSpPr txBox="1"/>
+              <p:nvPr/>
+            </p:nvSpPr>
+            <p:spPr>
+              <a:xfrm>
+                <a:off x="1791731" y="2298357"/>
+                <a:ext cx="4588374" cy="1818703"/>
+              </a:xfrm>
+              <a:prstGeom prst="rect">
+                <a:avLst/>
+              </a:prstGeom>
+              <a:noFill/>
+            </p:spPr>
+            <p:txBody>
+              <a:bodyPr wrap="square" lIns="0" tIns="0" rIns="0" bIns="0" rtlCol="0">
+                <a:spAutoFit/>
+              </a:bodyPr>
+              <a:lstStyle/>
+              <a:p>
+                <a14:m>
+                  <m:oMathPara xmlns:m="http://schemas.openxmlformats.org/officeDocument/2006/math">
+                    <m:oMathParaPr>
+                      <m:jc m:val="centerGroup"/>
+                    </m:oMathParaPr>
+                    <m:oMath xmlns:m="http://schemas.openxmlformats.org/officeDocument/2006/math">
+                      <m:r>
+                        <a:rPr lang="en-US" sz="4000" b="0" i="1" smtClean="0">
+                          <a:solidFill>
+                            <a:srgbClr val="FFFF00"/>
+                          </a:solidFill>
+                          <a:latin typeface="Cambria Math" panose="02040503050406030204" pitchFamily="18" charset="0"/>
+                        </a:rPr>
+                        <m:t>𝑠</m:t>
+                      </m:r>
+                      <m:r>
+                        <a:rPr lang="en-US" sz="4000" b="0" i="1" smtClean="0">
+                          <a:solidFill>
+                            <a:srgbClr val="FFFF00"/>
+                          </a:solidFill>
+                          <a:latin typeface="Cambria Math" panose="02040503050406030204" pitchFamily="18" charset="0"/>
+                        </a:rPr>
+                        <m:t>=</m:t>
+                      </m:r>
+                      <m:rad>
+                        <m:radPr>
+                          <m:degHide m:val="on"/>
+                          <m:ctrlPr>
+                            <a:rPr lang="en-US" sz="4000" b="0" i="1" smtClean="0">
+                              <a:solidFill>
+                                <a:srgbClr val="FFFF00"/>
+                              </a:solidFill>
+                              <a:latin typeface="Cambria Math" panose="02040503050406030204" pitchFamily="18" charset="0"/>
+                            </a:rPr>
+                          </m:ctrlPr>
+                        </m:radPr>
+                        <m:deg/>
+                        <m:e>
+                          <m:f>
+                            <m:fPr>
+                              <m:ctrlPr>
+                                <a:rPr lang="en-US" sz="4000" b="0" i="1" smtClean="0">
+                                  <a:solidFill>
+                                    <a:srgbClr val="FFFF00"/>
+                                  </a:solidFill>
+                                  <a:latin typeface="Cambria Math" panose="02040503050406030204" pitchFamily="18" charset="0"/>
+                                </a:rPr>
+                              </m:ctrlPr>
+                            </m:fPr>
+                            <m:num>
+                              <m:nary>
+                                <m:naryPr>
+                                  <m:chr m:val="∑"/>
+                                  <m:ctrlPr>
+                                    <a:rPr lang="en-US" sz="4000" b="0" i="1" smtClean="0">
+                                      <a:solidFill>
+                                        <a:srgbClr val="FFFF00"/>
+                                      </a:solidFill>
+                                      <a:latin typeface="Cambria Math" panose="02040503050406030204" pitchFamily="18" charset="0"/>
+                                    </a:rPr>
+                                  </m:ctrlPr>
+                                </m:naryPr>
+                                <m:sub>
+                                  <m:r>
+                                    <m:rPr>
+                                      <m:brk m:alnAt="23"/>
+                                    </m:rPr>
+                                    <a:rPr lang="en-US" sz="4000" b="0" i="1" smtClean="0">
+                                      <a:solidFill>
+                                        <a:srgbClr val="FFFF00"/>
+                                      </a:solidFill>
+                                      <a:latin typeface="Cambria Math" panose="02040503050406030204" pitchFamily="18" charset="0"/>
+                                    </a:rPr>
+                                    <m:t>𝑖</m:t>
+                                  </m:r>
+                                  <m:r>
+                                    <a:rPr lang="en-US" sz="4000" b="0" i="1" smtClean="0">
+                                      <a:solidFill>
+                                        <a:srgbClr val="FFFF00"/>
+                                      </a:solidFill>
+                                      <a:latin typeface="Cambria Math" panose="02040503050406030204" pitchFamily="18" charset="0"/>
+                                    </a:rPr>
+                                    <m:t>=1</m:t>
+                                  </m:r>
+                                </m:sub>
+                                <m:sup>
+                                  <m:r>
+                                    <a:rPr lang="en-US" sz="4000" b="0" i="1" smtClean="0">
+                                      <a:solidFill>
+                                        <a:srgbClr val="FFFF00"/>
+                                      </a:solidFill>
+                                      <a:latin typeface="Cambria Math" panose="02040503050406030204" pitchFamily="18" charset="0"/>
+                                    </a:rPr>
+                                    <m:t>𝑛</m:t>
+                                  </m:r>
+                                </m:sup>
+                                <m:e>
+                                  <m:sSup>
+                                    <m:sSupPr>
+                                      <m:ctrlPr>
+                                        <a:rPr lang="en-US" sz="4000" b="0" i="1" smtClean="0">
+                                          <a:solidFill>
+                                            <a:srgbClr val="FFFF00"/>
+                                          </a:solidFill>
+                                          <a:latin typeface="Cambria Math" panose="02040503050406030204" pitchFamily="18" charset="0"/>
+                                        </a:rPr>
+                                      </m:ctrlPr>
+                                    </m:sSupPr>
+                                    <m:e>
+                                      <m:r>
+                                        <a:rPr lang="en-US" sz="4000" b="0" i="1" smtClean="0">
+                                          <a:solidFill>
+                                            <a:srgbClr val="FFFF00"/>
+                                          </a:solidFill>
+                                          <a:latin typeface="Cambria Math" panose="02040503050406030204" pitchFamily="18" charset="0"/>
+                                        </a:rPr>
+                                        <m:t>(</m:t>
+                                      </m:r>
+                                      <m:acc>
+                                        <m:accPr>
+                                          <m:chr m:val="̅"/>
+                                          <m:ctrlPr>
+                                            <a:rPr lang="en-US" sz="4000" i="1">
+                                              <a:solidFill>
+                                                <a:srgbClr val="FFFF00"/>
+                                              </a:solidFill>
+                                              <a:latin typeface="Cambria Math" panose="02040503050406030204" pitchFamily="18" charset="0"/>
+                                            </a:rPr>
+                                          </m:ctrlPr>
+                                        </m:accPr>
+                                        <m:e>
+                                          <m:r>
+                                            <a:rPr lang="en-US" sz="4000" i="1">
+                                              <a:solidFill>
+                                                <a:srgbClr val="FFFF00"/>
+                                              </a:solidFill>
+                                              <a:latin typeface="Cambria Math" panose="02040503050406030204" pitchFamily="18" charset="0"/>
+                                            </a:rPr>
+                                            <m:t>𝑋</m:t>
+                                          </m:r>
+                                        </m:e>
+                                      </m:acc>
+                                      <m:r>
+                                        <a:rPr lang="en-US" sz="4000" i="1">
+                                          <a:solidFill>
+                                            <a:srgbClr val="FFFF00"/>
+                                          </a:solidFill>
+                                          <a:latin typeface="Cambria Math" panose="02040503050406030204" pitchFamily="18" charset="0"/>
+                                        </a:rPr>
+                                        <m:t>−</m:t>
+                                      </m:r>
+                                      <m:r>
+                                        <a:rPr lang="en-US" sz="4000" i="1">
+                                          <a:solidFill>
+                                            <a:srgbClr val="FFFF00"/>
+                                          </a:solidFill>
+                                          <a:latin typeface="Cambria Math" panose="02040503050406030204" pitchFamily="18" charset="0"/>
+                                        </a:rPr>
+                                        <m:t>𝑥</m:t>
+                                      </m:r>
+                                      <m:r>
+                                        <a:rPr lang="en-US" sz="4000" i="1">
+                                          <a:solidFill>
+                                            <a:srgbClr val="FFFF00"/>
+                                          </a:solidFill>
+                                          <a:latin typeface="Cambria Math" panose="02040503050406030204" pitchFamily="18" charset="0"/>
+                                        </a:rPr>
+                                        <m:t>)</m:t>
+                                      </m:r>
+                                    </m:e>
+                                    <m:sup>
+                                      <m:r>
+                                        <a:rPr lang="en-US" sz="4000" b="0" i="1" smtClean="0">
+                                          <a:solidFill>
+                                            <a:srgbClr val="FFFF00"/>
+                                          </a:solidFill>
+                                          <a:latin typeface="Cambria Math" panose="02040503050406030204" pitchFamily="18" charset="0"/>
+                                        </a:rPr>
+                                        <m:t>2</m:t>
+                                      </m:r>
+                                    </m:sup>
+                                  </m:sSup>
+                                </m:e>
+                              </m:nary>
+                            </m:num>
+                            <m:den>
+                              <m:r>
+                                <a:rPr lang="en-US" sz="4000" b="0" i="1" smtClean="0">
+                                  <a:solidFill>
+                                    <a:srgbClr val="FFFF00"/>
+                                  </a:solidFill>
+                                  <a:latin typeface="Cambria Math" panose="02040503050406030204" pitchFamily="18" charset="0"/>
+                                </a:rPr>
+                                <m:t>𝑛</m:t>
+                              </m:r>
+                              <m:r>
+                                <a:rPr lang="en-US" sz="4000" b="0" i="1" smtClean="0">
+                                  <a:solidFill>
+                                    <a:srgbClr val="FFFF00"/>
+                                  </a:solidFill>
+                                  <a:latin typeface="Cambria Math" panose="02040503050406030204" pitchFamily="18" charset="0"/>
+                                </a:rPr>
+                                <m:t>−1</m:t>
+                              </m:r>
+                            </m:den>
+                          </m:f>
+                        </m:e>
+                      </m:rad>
+                    </m:oMath>
+                  </m:oMathPara>
+                </a14:m>
+                <a:endParaRPr lang="en-US" sz="1800" dirty="0">
+                  <a:solidFill>
+                    <a:srgbClr val="FFFF00"/>
+                  </a:solidFill>
+                </a:endParaRPr>
+              </a:p>
+            </p:txBody>
+          </p:sp>
+        </mc:Choice>
+        <mc:Fallback>
+          <p:sp>
+            <p:nvSpPr>
+              <p:cNvPr id="11" name="TextBox 10"/>
+              <p:cNvSpPr txBox="1">
+                <a:spLocks noRot="1" noChangeAspect="1" noMove="1" noResize="1" noEditPoints="1" noAdjustHandles="1" noChangeArrowheads="1" noChangeShapeType="1" noTextEdit="1"/>
+              </p:cNvSpPr>
+              <p:nvPr/>
+            </p:nvSpPr>
+            <p:spPr>
+              <a:xfrm>
+                <a:off x="1791731" y="2298357"/>
+                <a:ext cx="4588374" cy="1818703"/>
+              </a:xfrm>
+              <a:prstGeom prst="rect">
+                <a:avLst/>
+              </a:prstGeom>
+              <a:blipFill>
+                <a:blip r:embed="rId3"/>
+                <a:stretch>
+                  <a:fillRect/>
+                </a:stretch>
+              </a:blipFill>
+            </p:spPr>
+            <p:txBody>
+              <a:bodyPr/>
+              <a:lstStyle/>
+              <a:p>
+                <a:r>
+                  <a:rPr lang="en-US">
+                    <a:noFill/>
+                  </a:rPr>
+                  <a:t> </a:t>
+                </a:r>
+              </a:p>
+            </p:txBody>
+          </p:sp>
+        </mc:Fallback>
+      </mc:AlternateContent>
     </p:spTree>
   </p:cSld>
   <p:clrMapOvr>

</xml_diff>